<commit_message>
course intro for new FPGA board
</commit_message>
<xml_diff>
--- a/Lectures/lec00-course_intro/lab00-lab_rules.pptx
+++ b/Lectures/lec00-course_intro/lab00-lab_rules.pptx
@@ -6,7 +6,7 @@
     <p:sldMasterId id="2147483650" r:id="rId2"/>
   </p:sldMasterIdLst>
   <p:notesMasterIdLst>
-    <p:notesMasterId r:id="rId12"/>
+    <p:notesMasterId r:id="rId10"/>
   </p:notesMasterIdLst>
   <p:sldIdLst>
     <p:sldId id="256" r:id="rId3"/>
@@ -15,9 +15,7 @@
     <p:sldId id="259" r:id="rId6"/>
     <p:sldId id="258" r:id="rId7"/>
     <p:sldId id="260" r:id="rId8"/>
-    <p:sldId id="261" r:id="rId9"/>
-    <p:sldId id="262" r:id="rId10"/>
-    <p:sldId id="263" r:id="rId11"/>
+    <p:sldId id="263" r:id="rId9"/>
   </p:sldIdLst>
   <p:sldSz cx="9144000" cy="6858000" type="screen4x3"/>
   <p:notesSz cx="6858000" cy="9144000"/>
@@ -318,7 +316,7 @@
           <a:lstStyle/>
           <a:p>
             <a:pPr lvl="0"/>
-            <a:endParaRPr lang="zh-TW" altLang="en-US" noProof="0" smtClean="0"/>
+            <a:endParaRPr lang="zh-TW" altLang="en-US" noProof="0"/>
           </a:p>
         </p:txBody>
       </p:sp>
@@ -576,7 +574,7 @@
           <a:bodyPr wrap="none" anchor="ctr"/>
           <a:lstStyle/>
           <a:p>
-            <a:endParaRPr lang="zh-TW" altLang="en-US" smtClean="0"/>
+            <a:endParaRPr lang="zh-TW" altLang="en-US"/>
           </a:p>
         </p:txBody>
       </p:sp>
@@ -689,7 +687,7 @@
           <a:bodyPr wrap="none" anchor="ctr"/>
           <a:lstStyle/>
           <a:p>
-            <a:endParaRPr lang="zh-TW" altLang="en-US" smtClean="0"/>
+            <a:endParaRPr lang="zh-TW" altLang="en-US"/>
           </a:p>
         </p:txBody>
       </p:sp>
@@ -802,7 +800,7 @@
           <a:bodyPr wrap="none" anchor="ctr"/>
           <a:lstStyle/>
           <a:p>
-            <a:endParaRPr lang="zh-TW" altLang="en-US" smtClean="0"/>
+            <a:endParaRPr lang="zh-TW" altLang="en-US"/>
           </a:p>
         </p:txBody>
       </p:sp>
@@ -915,7 +913,7 @@
           <a:bodyPr wrap="none" anchor="ctr"/>
           <a:lstStyle/>
           <a:p>
-            <a:endParaRPr lang="zh-TW" altLang="en-US" smtClean="0"/>
+            <a:endParaRPr lang="zh-TW" altLang="en-US"/>
           </a:p>
         </p:txBody>
       </p:sp>
@@ -1028,7 +1026,7 @@
           <a:bodyPr wrap="none" anchor="ctr"/>
           <a:lstStyle/>
           <a:p>
-            <a:endParaRPr lang="zh-TW" altLang="en-US" smtClean="0"/>
+            <a:endParaRPr lang="zh-TW" altLang="en-US"/>
           </a:p>
         </p:txBody>
       </p:sp>
@@ -1072,7 +1070,7 @@
       </p:grpSpPr>
       <p:sp>
         <p:nvSpPr>
-          <p:cNvPr id="17410" name="Rectangle 1"/>
+          <p:cNvPr id="21506" name="Rectangle 1"/>
           <p:cNvSpPr txBox="1">
             <a:spLocks noGrp="1" noRot="1" noChangeAspect="1" noChangeArrowheads="1" noTextEdit="1"/>
           </p:cNvSpPr>
@@ -1111,7 +1109,7 @@
       </p:sp>
       <p:sp>
         <p:nvSpPr>
-          <p:cNvPr id="17411" name="Rectangle 2"/>
+          <p:cNvPr id="21507" name="Rectangle 2"/>
           <p:cNvSpPr txBox="1">
             <a:spLocks noGrp="1" noChangeArrowheads="1"/>
           </p:cNvSpPr>
@@ -1141,233 +1139,7 @@
           <a:bodyPr wrap="none" anchor="ctr"/>
           <a:lstStyle/>
           <a:p>
-            <a:endParaRPr lang="zh-TW" altLang="en-US" smtClean="0"/>
-          </a:p>
-        </p:txBody>
-      </p:sp>
-    </p:spTree>
-    <p:extLst>
-      <p:ext uri="{BB962C8B-B14F-4D97-AF65-F5344CB8AC3E}">
-        <p14:creationId xmlns:p14="http://schemas.microsoft.com/office/powerpoint/2010/main" val="1177461766"/>
-      </p:ext>
-    </p:extLst>
-  </p:cSld>
-  <p:clrMapOvr>
-    <a:masterClrMapping/>
-  </p:clrMapOvr>
-</p:notes>
-</file>
-
-<file path=ppt/notesSlides/notesSlide7.xml><?xml version="1.0" encoding="utf-8"?>
-<p:notes xmlns:a="http://schemas.openxmlformats.org/drawingml/2006/main" xmlns:r="http://schemas.openxmlformats.org/officeDocument/2006/relationships" xmlns:p="http://schemas.openxmlformats.org/presentationml/2006/main">
-  <p:cSld>
-    <p:bg>
-      <p:bgPr>
-        <a:solidFill>
-          <a:srgbClr val="FFFFFF"/>
-        </a:solidFill>
-        <a:effectLst/>
-      </p:bgPr>
-    </p:bg>
-    <p:spTree>
-      <p:nvGrpSpPr>
-        <p:cNvPr id="1" name=""/>
-        <p:cNvGrpSpPr/>
-        <p:nvPr/>
-      </p:nvGrpSpPr>
-      <p:grpSpPr>
-        <a:xfrm>
-          <a:off x="0" y="0"/>
-          <a:ext cx="0" cy="0"/>
-          <a:chOff x="0" y="0"/>
-          <a:chExt cx="0" cy="0"/>
-        </a:xfrm>
-      </p:grpSpPr>
-      <p:sp>
-        <p:nvSpPr>
-          <p:cNvPr id="19458" name="Rectangle 1"/>
-          <p:cNvSpPr txBox="1">
-            <a:spLocks noGrp="1" noRot="1" noChangeAspect="1" noChangeArrowheads="1" noTextEdit="1"/>
-          </p:cNvSpPr>
-          <p:nvPr>
-            <p:ph type="sldImg"/>
-          </p:nvPr>
-        </p:nvSpPr>
-        <p:spPr>
-          <a:xfrm>
-            <a:off x="1143000" y="695325"/>
-            <a:ext cx="4572000" cy="3429000"/>
-          </a:xfrm>
-          <a:solidFill>
-            <a:srgbClr val="FFFFFF"/>
-          </a:solidFill>
-          <a:ln>
-            <a:solidFill>
-              <a:srgbClr val="000000"/>
-            </a:solidFill>
-            <a:miter lim="800000"/>
-            <a:headEnd/>
-            <a:tailEnd/>
-          </a:ln>
-          <a:extLst>
-            <a:ext uri="{AF507438-7753-43E0-B8FC-AC1667EBCBE1}">
-              <a14:hiddenEffects xmlns:a14="http://schemas.microsoft.com/office/drawing/2010/main">
-                <a:effectLst>
-                  <a:outerShdw dist="35921" dir="2700000" algn="ctr" rotWithShape="0">
-                    <a:srgbClr val="808080"/>
-                  </a:outerShdw>
-                </a:effectLst>
-              </a14:hiddenEffects>
-            </a:ext>
-          </a:extLst>
-        </p:spPr>
-      </p:sp>
-      <p:sp>
-        <p:nvSpPr>
-          <p:cNvPr id="19459" name="Rectangle 2"/>
-          <p:cNvSpPr txBox="1">
-            <a:spLocks noGrp="1" noChangeArrowheads="1"/>
-          </p:cNvSpPr>
-          <p:nvPr>
-            <p:ph type="body" idx="1"/>
-          </p:nvPr>
-        </p:nvSpPr>
-        <p:spPr>
-          <a:xfrm>
-            <a:off x="685800" y="4343400"/>
-            <a:ext cx="5486400" cy="4114800"/>
-          </a:xfrm>
-          <a:noFill/>
-          <a:extLst>
-            <a:ext uri="{AF507438-7753-43E0-B8FC-AC1667EBCBE1}">
-              <a14:hiddenEffects xmlns:a14="http://schemas.microsoft.com/office/drawing/2010/main">
-                <a:effectLst>
-                  <a:outerShdw dist="35921" dir="2700000" algn="ctr" rotWithShape="0">
-                    <a:srgbClr val="808080"/>
-                  </a:outerShdw>
-                </a:effectLst>
-              </a14:hiddenEffects>
-            </a:ext>
-          </a:extLst>
-        </p:spPr>
-        <p:txBody>
-          <a:bodyPr wrap="none" anchor="ctr"/>
-          <a:lstStyle/>
-          <a:p>
-            <a:endParaRPr lang="zh-TW" altLang="en-US" smtClean="0"/>
-          </a:p>
-        </p:txBody>
-      </p:sp>
-    </p:spTree>
-    <p:extLst>
-      <p:ext uri="{BB962C8B-B14F-4D97-AF65-F5344CB8AC3E}">
-        <p14:creationId xmlns:p14="http://schemas.microsoft.com/office/powerpoint/2010/main" val="120870988"/>
-      </p:ext>
-    </p:extLst>
-  </p:cSld>
-  <p:clrMapOvr>
-    <a:masterClrMapping/>
-  </p:clrMapOvr>
-</p:notes>
-</file>
-
-<file path=ppt/notesSlides/notesSlide8.xml><?xml version="1.0" encoding="utf-8"?>
-<p:notes xmlns:a="http://schemas.openxmlformats.org/drawingml/2006/main" xmlns:r="http://schemas.openxmlformats.org/officeDocument/2006/relationships" xmlns:p="http://schemas.openxmlformats.org/presentationml/2006/main">
-  <p:cSld>
-    <p:bg>
-      <p:bgPr>
-        <a:solidFill>
-          <a:srgbClr val="FFFFFF"/>
-        </a:solidFill>
-        <a:effectLst/>
-      </p:bgPr>
-    </p:bg>
-    <p:spTree>
-      <p:nvGrpSpPr>
-        <p:cNvPr id="1" name=""/>
-        <p:cNvGrpSpPr/>
-        <p:nvPr/>
-      </p:nvGrpSpPr>
-      <p:grpSpPr>
-        <a:xfrm>
-          <a:off x="0" y="0"/>
-          <a:ext cx="0" cy="0"/>
-          <a:chOff x="0" y="0"/>
-          <a:chExt cx="0" cy="0"/>
-        </a:xfrm>
-      </p:grpSpPr>
-      <p:sp>
-        <p:nvSpPr>
-          <p:cNvPr id="21506" name="Rectangle 1"/>
-          <p:cNvSpPr txBox="1">
-            <a:spLocks noGrp="1" noRot="1" noChangeAspect="1" noChangeArrowheads="1" noTextEdit="1"/>
-          </p:cNvSpPr>
-          <p:nvPr>
-            <p:ph type="sldImg"/>
-          </p:nvPr>
-        </p:nvSpPr>
-        <p:spPr>
-          <a:xfrm>
-            <a:off x="1143000" y="695325"/>
-            <a:ext cx="4572000" cy="3429000"/>
-          </a:xfrm>
-          <a:solidFill>
-            <a:srgbClr val="FFFFFF"/>
-          </a:solidFill>
-          <a:ln>
-            <a:solidFill>
-              <a:srgbClr val="000000"/>
-            </a:solidFill>
-            <a:miter lim="800000"/>
-            <a:headEnd/>
-            <a:tailEnd/>
-          </a:ln>
-          <a:extLst>
-            <a:ext uri="{AF507438-7753-43E0-B8FC-AC1667EBCBE1}">
-              <a14:hiddenEffects xmlns:a14="http://schemas.microsoft.com/office/drawing/2010/main">
-                <a:effectLst>
-                  <a:outerShdw dist="35921" dir="2700000" algn="ctr" rotWithShape="0">
-                    <a:srgbClr val="808080"/>
-                  </a:outerShdw>
-                </a:effectLst>
-              </a14:hiddenEffects>
-            </a:ext>
-          </a:extLst>
-        </p:spPr>
-      </p:sp>
-      <p:sp>
-        <p:nvSpPr>
-          <p:cNvPr id="21507" name="Rectangle 2"/>
-          <p:cNvSpPr txBox="1">
-            <a:spLocks noGrp="1" noChangeArrowheads="1"/>
-          </p:cNvSpPr>
-          <p:nvPr>
-            <p:ph type="body" idx="1"/>
-          </p:nvPr>
-        </p:nvSpPr>
-        <p:spPr>
-          <a:xfrm>
-            <a:off x="685800" y="4343400"/>
-            <a:ext cx="5486400" cy="4114800"/>
-          </a:xfrm>
-          <a:noFill/>
-          <a:extLst>
-            <a:ext uri="{AF507438-7753-43E0-B8FC-AC1667EBCBE1}">
-              <a14:hiddenEffects xmlns:a14="http://schemas.microsoft.com/office/drawing/2010/main">
-                <a:effectLst>
-                  <a:outerShdw dist="35921" dir="2700000" algn="ctr" rotWithShape="0">
-                    <a:srgbClr val="808080"/>
-                  </a:outerShdw>
-                </a:effectLst>
-              </a14:hiddenEffects>
-            </a:ext>
-          </a:extLst>
-        </p:spPr>
-        <p:txBody>
-          <a:bodyPr wrap="none" anchor="ctr"/>
-          <a:lstStyle/>
-          <a:p>
-            <a:endParaRPr lang="zh-TW" altLang="en-US" smtClean="0"/>
+            <a:endParaRPr lang="zh-TW" altLang="en-US"/>
           </a:p>
         </p:txBody>
       </p:sp>
@@ -1426,10 +1198,9 @@
           </a:lstStyle>
           <a:p>
             <a:r>
-              <a:rPr lang="zh-TW" altLang="en-US" smtClean="0"/>
+              <a:rPr lang="zh-TW" altLang="en-US"/>
               <a:t>按一下以編輯母片標題樣式</a:t>
             </a:r>
-            <a:endParaRPr lang="zh-TW" altLang="en-US"/>
           </a:p>
         </p:txBody>
       </p:sp>
@@ -1491,10 +1262,9 @@
           </a:lstStyle>
           <a:p>
             <a:r>
-              <a:rPr lang="zh-TW" altLang="en-US" smtClean="0"/>
+              <a:rPr lang="zh-TW" altLang="en-US"/>
               <a:t>按一下以編輯母片副標題樣式</a:t>
             </a:r>
-            <a:endParaRPr lang="zh-TW" altLang="en-US"/>
           </a:p>
         </p:txBody>
       </p:sp>
@@ -1635,10 +1405,9 @@
           <a:lstStyle/>
           <a:p>
             <a:r>
-              <a:rPr lang="zh-TW" altLang="en-US" smtClean="0"/>
+              <a:rPr lang="zh-TW" altLang="en-US"/>
               <a:t>按一下以編輯母片標題樣式</a:t>
             </a:r>
-            <a:endParaRPr lang="zh-TW" altLang="en-US"/>
           </a:p>
         </p:txBody>
       </p:sp>
@@ -1659,38 +1428,37 @@
           <a:p>
             <a:pPr lvl="0"/>
             <a:r>
-              <a:rPr lang="zh-TW" altLang="en-US" smtClean="0"/>
+              <a:rPr lang="zh-TW" altLang="en-US"/>
               <a:t>按一下以編輯母片文字樣式</a:t>
             </a:r>
           </a:p>
           <a:p>
             <a:pPr lvl="1"/>
             <a:r>
-              <a:rPr lang="zh-TW" altLang="en-US" smtClean="0"/>
+              <a:rPr lang="zh-TW" altLang="en-US"/>
               <a:t>第二層</a:t>
             </a:r>
           </a:p>
           <a:p>
             <a:pPr lvl="2"/>
             <a:r>
-              <a:rPr lang="zh-TW" altLang="en-US" smtClean="0"/>
+              <a:rPr lang="zh-TW" altLang="en-US"/>
               <a:t>第三層</a:t>
             </a:r>
           </a:p>
           <a:p>
             <a:pPr lvl="3"/>
             <a:r>
-              <a:rPr lang="zh-TW" altLang="en-US" smtClean="0"/>
+              <a:rPr lang="zh-TW" altLang="en-US"/>
               <a:t>第四層</a:t>
             </a:r>
           </a:p>
           <a:p>
             <a:pPr lvl="4"/>
             <a:r>
-              <a:rPr lang="zh-TW" altLang="en-US" smtClean="0"/>
+              <a:rPr lang="zh-TW" altLang="en-US"/>
               <a:t>第五層</a:t>
             </a:r>
-            <a:endParaRPr lang="zh-TW" altLang="en-US"/>
           </a:p>
         </p:txBody>
       </p:sp>
@@ -1836,10 +1604,9 @@
           <a:lstStyle/>
           <a:p>
             <a:r>
-              <a:rPr lang="zh-TW" altLang="en-US" smtClean="0"/>
+              <a:rPr lang="zh-TW" altLang="en-US"/>
               <a:t>按一下以編輯母片標題樣式</a:t>
             </a:r>
-            <a:endParaRPr lang="zh-TW" altLang="en-US"/>
           </a:p>
         </p:txBody>
       </p:sp>
@@ -1865,38 +1632,37 @@
           <a:p>
             <a:pPr lvl="0"/>
             <a:r>
-              <a:rPr lang="zh-TW" altLang="en-US" smtClean="0"/>
+              <a:rPr lang="zh-TW" altLang="en-US"/>
               <a:t>按一下以編輯母片文字樣式</a:t>
             </a:r>
           </a:p>
           <a:p>
             <a:pPr lvl="1"/>
             <a:r>
-              <a:rPr lang="zh-TW" altLang="en-US" smtClean="0"/>
+              <a:rPr lang="zh-TW" altLang="en-US"/>
               <a:t>第二層</a:t>
             </a:r>
           </a:p>
           <a:p>
             <a:pPr lvl="2"/>
             <a:r>
-              <a:rPr lang="zh-TW" altLang="en-US" smtClean="0"/>
+              <a:rPr lang="zh-TW" altLang="en-US"/>
               <a:t>第三層</a:t>
             </a:r>
           </a:p>
           <a:p>
             <a:pPr lvl="3"/>
             <a:r>
-              <a:rPr lang="zh-TW" altLang="en-US" smtClean="0"/>
+              <a:rPr lang="zh-TW" altLang="en-US"/>
               <a:t>第四層</a:t>
             </a:r>
           </a:p>
           <a:p>
             <a:pPr lvl="4"/>
             <a:r>
-              <a:rPr lang="zh-TW" altLang="en-US" smtClean="0"/>
+              <a:rPr lang="zh-TW" altLang="en-US"/>
               <a:t>第五層</a:t>
             </a:r>
-            <a:endParaRPr lang="zh-TW" altLang="en-US"/>
           </a:p>
         </p:txBody>
       </p:sp>
@@ -2042,10 +1808,9 @@
           <a:lstStyle/>
           <a:p>
             <a:r>
-              <a:rPr lang="zh-TW" altLang="en-US" smtClean="0"/>
+              <a:rPr lang="zh-TW" altLang="en-US"/>
               <a:t>按一下以編輯母片標題樣式</a:t>
             </a:r>
-            <a:endParaRPr lang="zh-TW" altLang="en-US"/>
           </a:p>
         </p:txBody>
       </p:sp>
@@ -2706,7 +2471,7 @@
           <a:p>
             <a:pPr lvl="0"/>
             <a:r>
-              <a:rPr lang="zh-TW" altLang="en-US" noProof="0" smtClean="0"/>
+              <a:rPr lang="zh-TW" altLang="en-US" noProof="0"/>
               <a:t>按一下以編輯母片標題樣式</a:t>
             </a:r>
           </a:p>
@@ -2740,7 +2505,7 @@
           <a:p>
             <a:pPr lvl="0"/>
             <a:r>
-              <a:rPr lang="zh-TW" altLang="en-US" noProof="0" smtClean="0"/>
+              <a:rPr lang="zh-TW" altLang="en-US" noProof="0"/>
               <a:t>按一下以編輯母片副標題樣式</a:t>
             </a:r>
           </a:p>
@@ -2904,10 +2669,9 @@
           <a:lstStyle/>
           <a:p>
             <a:r>
-              <a:rPr lang="zh-TW" altLang="en-US" smtClean="0"/>
+              <a:rPr lang="zh-TW" altLang="en-US"/>
               <a:t>按一下以編輯母片標題樣式</a:t>
             </a:r>
-            <a:endParaRPr lang="zh-TW" altLang="en-US"/>
           </a:p>
         </p:txBody>
       </p:sp>
@@ -2928,38 +2692,37 @@
           <a:p>
             <a:pPr lvl="0"/>
             <a:r>
-              <a:rPr lang="zh-TW" altLang="en-US" smtClean="0"/>
+              <a:rPr lang="zh-TW" altLang="en-US"/>
               <a:t>按一下以編輯母片文字樣式</a:t>
             </a:r>
           </a:p>
           <a:p>
             <a:pPr lvl="1"/>
             <a:r>
-              <a:rPr lang="zh-TW" altLang="en-US" smtClean="0"/>
+              <a:rPr lang="zh-TW" altLang="en-US"/>
               <a:t>第二層</a:t>
             </a:r>
           </a:p>
           <a:p>
             <a:pPr lvl="2"/>
             <a:r>
-              <a:rPr lang="zh-TW" altLang="en-US" smtClean="0"/>
+              <a:rPr lang="zh-TW" altLang="en-US"/>
               <a:t>第三層</a:t>
             </a:r>
           </a:p>
           <a:p>
             <a:pPr lvl="3"/>
             <a:r>
-              <a:rPr lang="zh-TW" altLang="en-US" smtClean="0"/>
+              <a:rPr lang="zh-TW" altLang="en-US"/>
               <a:t>第四層</a:t>
             </a:r>
           </a:p>
           <a:p>
             <a:pPr lvl="4"/>
             <a:r>
-              <a:rPr lang="zh-TW" altLang="en-US" smtClean="0"/>
+              <a:rPr lang="zh-TW" altLang="en-US"/>
               <a:t>第五層</a:t>
             </a:r>
-            <a:endParaRPr lang="zh-TW" altLang="en-US"/>
           </a:p>
         </p:txBody>
       </p:sp>
@@ -3109,10 +2872,9 @@
           </a:lstStyle>
           <a:p>
             <a:r>
-              <a:rPr lang="zh-TW" altLang="en-US" smtClean="0"/>
+              <a:rPr lang="zh-TW" altLang="en-US"/>
               <a:t>按一下以編輯母片標題樣式</a:t>
             </a:r>
-            <a:endParaRPr lang="zh-TW" altLang="en-US"/>
           </a:p>
         </p:txBody>
       </p:sp>
@@ -3175,7 +2937,7 @@
           <a:p>
             <a:pPr lvl="0"/>
             <a:r>
-              <a:rPr lang="zh-TW" altLang="en-US" smtClean="0"/>
+              <a:rPr lang="zh-TW" altLang="en-US"/>
               <a:t>按一下以編輯母片文字樣式</a:t>
             </a:r>
           </a:p>
@@ -3318,10 +3080,9 @@
           <a:lstStyle/>
           <a:p>
             <a:r>
-              <a:rPr lang="zh-TW" altLang="en-US" smtClean="0"/>
+              <a:rPr lang="zh-TW" altLang="en-US"/>
               <a:t>按一下以編輯母片標題樣式</a:t>
             </a:r>
-            <a:endParaRPr lang="zh-TW" altLang="en-US"/>
           </a:p>
         </p:txBody>
       </p:sp>
@@ -3347,38 +3108,37 @@
           <a:p>
             <a:pPr lvl="0"/>
             <a:r>
-              <a:rPr lang="zh-TW" altLang="en-US" smtClean="0"/>
+              <a:rPr lang="zh-TW" altLang="en-US"/>
               <a:t>按一下以編輯母片文字樣式</a:t>
             </a:r>
           </a:p>
           <a:p>
             <a:pPr lvl="1"/>
             <a:r>
-              <a:rPr lang="zh-TW" altLang="en-US" smtClean="0"/>
+              <a:rPr lang="zh-TW" altLang="en-US"/>
               <a:t>第二層</a:t>
             </a:r>
           </a:p>
           <a:p>
             <a:pPr lvl="2"/>
             <a:r>
-              <a:rPr lang="zh-TW" altLang="en-US" smtClean="0"/>
+              <a:rPr lang="zh-TW" altLang="en-US"/>
               <a:t>第三層</a:t>
             </a:r>
           </a:p>
           <a:p>
             <a:pPr lvl="3"/>
             <a:r>
-              <a:rPr lang="zh-TW" altLang="en-US" smtClean="0"/>
+              <a:rPr lang="zh-TW" altLang="en-US"/>
               <a:t>第四層</a:t>
             </a:r>
           </a:p>
           <a:p>
             <a:pPr lvl="4"/>
             <a:r>
-              <a:rPr lang="zh-TW" altLang="en-US" smtClean="0"/>
+              <a:rPr lang="zh-TW" altLang="en-US"/>
               <a:t>第五層</a:t>
             </a:r>
-            <a:endParaRPr lang="zh-TW" altLang="en-US"/>
           </a:p>
         </p:txBody>
       </p:sp>
@@ -3404,38 +3164,37 @@
           <a:p>
             <a:pPr lvl="0"/>
             <a:r>
-              <a:rPr lang="zh-TW" altLang="en-US" smtClean="0"/>
+              <a:rPr lang="zh-TW" altLang="en-US"/>
               <a:t>按一下以編輯母片文字樣式</a:t>
             </a:r>
           </a:p>
           <a:p>
             <a:pPr lvl="1"/>
             <a:r>
-              <a:rPr lang="zh-TW" altLang="en-US" smtClean="0"/>
+              <a:rPr lang="zh-TW" altLang="en-US"/>
               <a:t>第二層</a:t>
             </a:r>
           </a:p>
           <a:p>
             <a:pPr lvl="2"/>
             <a:r>
-              <a:rPr lang="zh-TW" altLang="en-US" smtClean="0"/>
+              <a:rPr lang="zh-TW" altLang="en-US"/>
               <a:t>第三層</a:t>
             </a:r>
           </a:p>
           <a:p>
             <a:pPr lvl="3"/>
             <a:r>
-              <a:rPr lang="zh-TW" altLang="en-US" smtClean="0"/>
+              <a:rPr lang="zh-TW" altLang="en-US"/>
               <a:t>第四層</a:t>
             </a:r>
           </a:p>
           <a:p>
             <a:pPr lvl="4"/>
             <a:r>
-              <a:rPr lang="zh-TW" altLang="en-US" smtClean="0"/>
+              <a:rPr lang="zh-TW" altLang="en-US"/>
               <a:t>第五層</a:t>
             </a:r>
-            <a:endParaRPr lang="zh-TW" altLang="en-US"/>
           </a:p>
         </p:txBody>
       </p:sp>
@@ -3581,10 +3340,9 @@
           <a:lstStyle/>
           <a:p>
             <a:r>
-              <a:rPr lang="zh-TW" altLang="en-US" smtClean="0"/>
+              <a:rPr lang="zh-TW" altLang="en-US"/>
               <a:t>按一下以編輯母片標題樣式</a:t>
             </a:r>
-            <a:endParaRPr lang="zh-TW" altLang="en-US"/>
           </a:p>
         </p:txBody>
       </p:sp>
@@ -3647,7 +3405,7 @@
           <a:p>
             <a:pPr lvl="0"/>
             <a:r>
-              <a:rPr lang="zh-TW" altLang="en-US" smtClean="0"/>
+              <a:rPr lang="zh-TW" altLang="en-US"/>
               <a:t>按一下以編輯母片文字樣式</a:t>
             </a:r>
           </a:p>
@@ -3675,38 +3433,37 @@
           <a:p>
             <a:pPr lvl="0"/>
             <a:r>
-              <a:rPr lang="zh-TW" altLang="en-US" smtClean="0"/>
+              <a:rPr lang="zh-TW" altLang="en-US"/>
               <a:t>按一下以編輯母片文字樣式</a:t>
             </a:r>
           </a:p>
           <a:p>
             <a:pPr lvl="1"/>
             <a:r>
-              <a:rPr lang="zh-TW" altLang="en-US" smtClean="0"/>
+              <a:rPr lang="zh-TW" altLang="en-US"/>
               <a:t>第二層</a:t>
             </a:r>
           </a:p>
           <a:p>
             <a:pPr lvl="2"/>
             <a:r>
-              <a:rPr lang="zh-TW" altLang="en-US" smtClean="0"/>
+              <a:rPr lang="zh-TW" altLang="en-US"/>
               <a:t>第三層</a:t>
             </a:r>
           </a:p>
           <a:p>
             <a:pPr lvl="3"/>
             <a:r>
-              <a:rPr lang="zh-TW" altLang="en-US" smtClean="0"/>
+              <a:rPr lang="zh-TW" altLang="en-US"/>
               <a:t>第四層</a:t>
             </a:r>
           </a:p>
           <a:p>
             <a:pPr lvl="4"/>
             <a:r>
-              <a:rPr lang="zh-TW" altLang="en-US" smtClean="0"/>
+              <a:rPr lang="zh-TW" altLang="en-US"/>
               <a:t>第五層</a:t>
             </a:r>
-            <a:endParaRPr lang="zh-TW" altLang="en-US"/>
           </a:p>
         </p:txBody>
       </p:sp>
@@ -3769,7 +3526,7 @@
           <a:p>
             <a:pPr lvl="0"/>
             <a:r>
-              <a:rPr lang="zh-TW" altLang="en-US" smtClean="0"/>
+              <a:rPr lang="zh-TW" altLang="en-US"/>
               <a:t>按一下以編輯母片文字樣式</a:t>
             </a:r>
           </a:p>
@@ -3797,38 +3554,37 @@
           <a:p>
             <a:pPr lvl="0"/>
             <a:r>
-              <a:rPr lang="zh-TW" altLang="en-US" smtClean="0"/>
+              <a:rPr lang="zh-TW" altLang="en-US"/>
               <a:t>按一下以編輯母片文字樣式</a:t>
             </a:r>
           </a:p>
           <a:p>
             <a:pPr lvl="1"/>
             <a:r>
-              <a:rPr lang="zh-TW" altLang="en-US" smtClean="0"/>
+              <a:rPr lang="zh-TW" altLang="en-US"/>
               <a:t>第二層</a:t>
             </a:r>
           </a:p>
           <a:p>
             <a:pPr lvl="2"/>
             <a:r>
-              <a:rPr lang="zh-TW" altLang="en-US" smtClean="0"/>
+              <a:rPr lang="zh-TW" altLang="en-US"/>
               <a:t>第三層</a:t>
             </a:r>
           </a:p>
           <a:p>
             <a:pPr lvl="3"/>
             <a:r>
-              <a:rPr lang="zh-TW" altLang="en-US" smtClean="0"/>
+              <a:rPr lang="zh-TW" altLang="en-US"/>
               <a:t>第四層</a:t>
             </a:r>
           </a:p>
           <a:p>
             <a:pPr lvl="4"/>
             <a:r>
-              <a:rPr lang="zh-TW" altLang="en-US" smtClean="0"/>
+              <a:rPr lang="zh-TW" altLang="en-US"/>
               <a:t>第五層</a:t>
             </a:r>
-            <a:endParaRPr lang="zh-TW" altLang="en-US"/>
           </a:p>
         </p:txBody>
       </p:sp>
@@ -3969,10 +3725,9 @@
           <a:lstStyle/>
           <a:p>
             <a:r>
-              <a:rPr lang="zh-TW" altLang="en-US" smtClean="0"/>
+              <a:rPr lang="zh-TW" altLang="en-US"/>
               <a:t>按一下以編輯母片標題樣式</a:t>
             </a:r>
-            <a:endParaRPr lang="zh-TW" altLang="en-US"/>
           </a:p>
         </p:txBody>
       </p:sp>
@@ -4234,10 +3989,9 @@
           <a:lstStyle/>
           <a:p>
             <a:r>
-              <a:rPr lang="zh-TW" altLang="en-US" smtClean="0"/>
+              <a:rPr lang="zh-TW" altLang="en-US"/>
               <a:t>按一下以編輯母片標題樣式</a:t>
             </a:r>
-            <a:endParaRPr lang="zh-TW" altLang="en-US"/>
           </a:p>
         </p:txBody>
       </p:sp>
@@ -4258,38 +4012,37 @@
           <a:p>
             <a:pPr lvl="0"/>
             <a:r>
-              <a:rPr lang="zh-TW" altLang="en-US" smtClean="0"/>
+              <a:rPr lang="zh-TW" altLang="en-US"/>
               <a:t>按一下以編輯母片文字樣式</a:t>
             </a:r>
           </a:p>
           <a:p>
             <a:pPr lvl="1"/>
             <a:r>
-              <a:rPr lang="zh-TW" altLang="en-US" smtClean="0"/>
+              <a:rPr lang="zh-TW" altLang="en-US"/>
               <a:t>第二層</a:t>
             </a:r>
           </a:p>
           <a:p>
             <a:pPr lvl="2"/>
             <a:r>
-              <a:rPr lang="zh-TW" altLang="en-US" smtClean="0"/>
+              <a:rPr lang="zh-TW" altLang="en-US"/>
               <a:t>第三層</a:t>
             </a:r>
           </a:p>
           <a:p>
             <a:pPr lvl="3"/>
             <a:r>
-              <a:rPr lang="zh-TW" altLang="en-US" smtClean="0"/>
+              <a:rPr lang="zh-TW" altLang="en-US"/>
               <a:t>第四層</a:t>
             </a:r>
           </a:p>
           <a:p>
             <a:pPr lvl="4"/>
             <a:r>
-              <a:rPr lang="zh-TW" altLang="en-US" smtClean="0"/>
+              <a:rPr lang="zh-TW" altLang="en-US"/>
               <a:t>第五層</a:t>
             </a:r>
-            <a:endParaRPr lang="zh-TW" altLang="en-US"/>
           </a:p>
         </p:txBody>
       </p:sp>
@@ -4439,10 +4192,9 @@
           </a:lstStyle>
           <a:p>
             <a:r>
-              <a:rPr lang="zh-TW" altLang="en-US" smtClean="0"/>
+              <a:rPr lang="zh-TW" altLang="en-US"/>
               <a:t>按一下以編輯母片標題樣式</a:t>
             </a:r>
-            <a:endParaRPr lang="zh-TW" altLang="en-US"/>
           </a:p>
         </p:txBody>
       </p:sp>
@@ -4496,38 +4248,37 @@
           <a:p>
             <a:pPr lvl="0"/>
             <a:r>
-              <a:rPr lang="zh-TW" altLang="en-US" smtClean="0"/>
+              <a:rPr lang="zh-TW" altLang="en-US"/>
               <a:t>按一下以編輯母片文字樣式</a:t>
             </a:r>
           </a:p>
           <a:p>
             <a:pPr lvl="1"/>
             <a:r>
-              <a:rPr lang="zh-TW" altLang="en-US" smtClean="0"/>
+              <a:rPr lang="zh-TW" altLang="en-US"/>
               <a:t>第二層</a:t>
             </a:r>
           </a:p>
           <a:p>
             <a:pPr lvl="2"/>
             <a:r>
-              <a:rPr lang="zh-TW" altLang="en-US" smtClean="0"/>
+              <a:rPr lang="zh-TW" altLang="en-US"/>
               <a:t>第三層</a:t>
             </a:r>
           </a:p>
           <a:p>
             <a:pPr lvl="3"/>
             <a:r>
-              <a:rPr lang="zh-TW" altLang="en-US" smtClean="0"/>
+              <a:rPr lang="zh-TW" altLang="en-US"/>
               <a:t>第四層</a:t>
             </a:r>
           </a:p>
           <a:p>
             <a:pPr lvl="4"/>
             <a:r>
-              <a:rPr lang="zh-TW" altLang="en-US" smtClean="0"/>
+              <a:rPr lang="zh-TW" altLang="en-US"/>
               <a:t>第五層</a:t>
             </a:r>
-            <a:endParaRPr lang="zh-TW" altLang="en-US"/>
           </a:p>
         </p:txBody>
       </p:sp>
@@ -4590,7 +4341,7 @@
           <a:p>
             <a:pPr lvl="0"/>
             <a:r>
-              <a:rPr lang="zh-TW" altLang="en-US" smtClean="0"/>
+              <a:rPr lang="zh-TW" altLang="en-US"/>
               <a:t>按一下以編輯母片文字樣式</a:t>
             </a:r>
           </a:p>
@@ -4742,10 +4493,9 @@
           </a:lstStyle>
           <a:p>
             <a:r>
-              <a:rPr lang="zh-TW" altLang="en-US" smtClean="0"/>
+              <a:rPr lang="zh-TW" altLang="en-US"/>
               <a:t>按一下以編輯母片標題樣式</a:t>
             </a:r>
-            <a:endParaRPr lang="zh-TW" altLang="en-US"/>
           </a:p>
         </p:txBody>
       </p:sp>
@@ -4807,7 +4557,7 @@
           </a:lstStyle>
           <a:p>
             <a:pPr lvl="0"/>
-            <a:endParaRPr lang="zh-TW" altLang="en-US" noProof="0" smtClean="0"/>
+            <a:endParaRPr lang="zh-TW" altLang="en-US" noProof="0"/>
           </a:p>
         </p:txBody>
       </p:sp>
@@ -4870,7 +4620,7 @@
           <a:p>
             <a:pPr lvl="0"/>
             <a:r>
-              <a:rPr lang="zh-TW" altLang="en-US" smtClean="0"/>
+              <a:rPr lang="zh-TW" altLang="en-US"/>
               <a:t>按一下以編輯母片文字樣式</a:t>
             </a:r>
           </a:p>
@@ -5013,10 +4763,9 @@
           <a:lstStyle/>
           <a:p>
             <a:r>
-              <a:rPr lang="zh-TW" altLang="en-US" smtClean="0"/>
+              <a:rPr lang="zh-TW" altLang="en-US"/>
               <a:t>按一下以編輯母片標題樣式</a:t>
             </a:r>
-            <a:endParaRPr lang="zh-TW" altLang="en-US"/>
           </a:p>
         </p:txBody>
       </p:sp>
@@ -5037,38 +4786,37 @@
           <a:p>
             <a:pPr lvl="0"/>
             <a:r>
-              <a:rPr lang="zh-TW" altLang="en-US" smtClean="0"/>
+              <a:rPr lang="zh-TW" altLang="en-US"/>
               <a:t>按一下以編輯母片文字樣式</a:t>
             </a:r>
           </a:p>
           <a:p>
             <a:pPr lvl="1"/>
             <a:r>
-              <a:rPr lang="zh-TW" altLang="en-US" smtClean="0"/>
+              <a:rPr lang="zh-TW" altLang="en-US"/>
               <a:t>第二層</a:t>
             </a:r>
           </a:p>
           <a:p>
             <a:pPr lvl="2"/>
             <a:r>
-              <a:rPr lang="zh-TW" altLang="en-US" smtClean="0"/>
+              <a:rPr lang="zh-TW" altLang="en-US"/>
               <a:t>第三層</a:t>
             </a:r>
           </a:p>
           <a:p>
             <a:pPr lvl="3"/>
             <a:r>
-              <a:rPr lang="zh-TW" altLang="en-US" smtClean="0"/>
+              <a:rPr lang="zh-TW" altLang="en-US"/>
               <a:t>第四層</a:t>
             </a:r>
           </a:p>
           <a:p>
             <a:pPr lvl="4"/>
             <a:r>
-              <a:rPr lang="zh-TW" altLang="en-US" smtClean="0"/>
+              <a:rPr lang="zh-TW" altLang="en-US"/>
               <a:t>第五層</a:t>
             </a:r>
-            <a:endParaRPr lang="zh-TW" altLang="en-US"/>
           </a:p>
         </p:txBody>
       </p:sp>
@@ -5214,10 +4962,9 @@
           <a:lstStyle/>
           <a:p>
             <a:r>
-              <a:rPr lang="zh-TW" altLang="en-US" smtClean="0"/>
+              <a:rPr lang="zh-TW" altLang="en-US"/>
               <a:t>按一下以編輯母片標題樣式</a:t>
             </a:r>
-            <a:endParaRPr lang="zh-TW" altLang="en-US"/>
           </a:p>
         </p:txBody>
       </p:sp>
@@ -5243,38 +4990,37 @@
           <a:p>
             <a:pPr lvl="0"/>
             <a:r>
-              <a:rPr lang="zh-TW" altLang="en-US" smtClean="0"/>
+              <a:rPr lang="zh-TW" altLang="en-US"/>
               <a:t>按一下以編輯母片文字樣式</a:t>
             </a:r>
           </a:p>
           <a:p>
             <a:pPr lvl="1"/>
             <a:r>
-              <a:rPr lang="zh-TW" altLang="en-US" smtClean="0"/>
+              <a:rPr lang="zh-TW" altLang="en-US"/>
               <a:t>第二層</a:t>
             </a:r>
           </a:p>
           <a:p>
             <a:pPr lvl="2"/>
             <a:r>
-              <a:rPr lang="zh-TW" altLang="en-US" smtClean="0"/>
+              <a:rPr lang="zh-TW" altLang="en-US"/>
               <a:t>第三層</a:t>
             </a:r>
           </a:p>
           <a:p>
             <a:pPr lvl="3"/>
             <a:r>
-              <a:rPr lang="zh-TW" altLang="en-US" smtClean="0"/>
+              <a:rPr lang="zh-TW" altLang="en-US"/>
               <a:t>第四層</a:t>
             </a:r>
           </a:p>
           <a:p>
             <a:pPr lvl="4"/>
             <a:r>
-              <a:rPr lang="zh-TW" altLang="en-US" smtClean="0"/>
+              <a:rPr lang="zh-TW" altLang="en-US"/>
               <a:t>第五層</a:t>
             </a:r>
-            <a:endParaRPr lang="zh-TW" altLang="en-US"/>
           </a:p>
         </p:txBody>
       </p:sp>
@@ -5424,10 +5170,9 @@
           </a:lstStyle>
           <a:p>
             <a:r>
-              <a:rPr lang="zh-TW" altLang="en-US" smtClean="0"/>
+              <a:rPr lang="zh-TW" altLang="en-US"/>
               <a:t>按一下以編輯母片標題樣式</a:t>
             </a:r>
-            <a:endParaRPr lang="zh-TW" altLang="en-US"/>
           </a:p>
         </p:txBody>
       </p:sp>
@@ -5490,7 +5235,7 @@
           <a:p>
             <a:pPr lvl="0"/>
             <a:r>
-              <a:rPr lang="zh-TW" altLang="en-US" smtClean="0"/>
+              <a:rPr lang="zh-TW" altLang="en-US"/>
               <a:t>按一下以編輯母片文字樣式</a:t>
             </a:r>
           </a:p>
@@ -5633,10 +5378,9 @@
           <a:lstStyle/>
           <a:p>
             <a:r>
-              <a:rPr lang="zh-TW" altLang="en-US" smtClean="0"/>
+              <a:rPr lang="zh-TW" altLang="en-US"/>
               <a:t>按一下以編輯母片標題樣式</a:t>
             </a:r>
-            <a:endParaRPr lang="zh-TW" altLang="en-US"/>
           </a:p>
         </p:txBody>
       </p:sp>
@@ -5662,38 +5406,37 @@
           <a:p>
             <a:pPr lvl="0"/>
             <a:r>
-              <a:rPr lang="zh-TW" altLang="en-US" smtClean="0"/>
+              <a:rPr lang="zh-TW" altLang="en-US"/>
               <a:t>按一下以編輯母片文字樣式</a:t>
             </a:r>
           </a:p>
           <a:p>
             <a:pPr lvl="1"/>
             <a:r>
-              <a:rPr lang="zh-TW" altLang="en-US" smtClean="0"/>
+              <a:rPr lang="zh-TW" altLang="en-US"/>
               <a:t>第二層</a:t>
             </a:r>
           </a:p>
           <a:p>
             <a:pPr lvl="2"/>
             <a:r>
-              <a:rPr lang="zh-TW" altLang="en-US" smtClean="0"/>
+              <a:rPr lang="zh-TW" altLang="en-US"/>
               <a:t>第三層</a:t>
             </a:r>
           </a:p>
           <a:p>
             <a:pPr lvl="3"/>
             <a:r>
-              <a:rPr lang="zh-TW" altLang="en-US" smtClean="0"/>
+              <a:rPr lang="zh-TW" altLang="en-US"/>
               <a:t>第四層</a:t>
             </a:r>
           </a:p>
           <a:p>
             <a:pPr lvl="4"/>
             <a:r>
-              <a:rPr lang="zh-TW" altLang="en-US" smtClean="0"/>
+              <a:rPr lang="zh-TW" altLang="en-US"/>
               <a:t>第五層</a:t>
             </a:r>
-            <a:endParaRPr lang="zh-TW" altLang="en-US"/>
           </a:p>
         </p:txBody>
       </p:sp>
@@ -5719,38 +5462,37 @@
           <a:p>
             <a:pPr lvl="0"/>
             <a:r>
-              <a:rPr lang="zh-TW" altLang="en-US" smtClean="0"/>
+              <a:rPr lang="zh-TW" altLang="en-US"/>
               <a:t>按一下以編輯母片文字樣式</a:t>
             </a:r>
           </a:p>
           <a:p>
             <a:pPr lvl="1"/>
             <a:r>
-              <a:rPr lang="zh-TW" altLang="en-US" smtClean="0"/>
+              <a:rPr lang="zh-TW" altLang="en-US"/>
               <a:t>第二層</a:t>
             </a:r>
           </a:p>
           <a:p>
             <a:pPr lvl="2"/>
             <a:r>
-              <a:rPr lang="zh-TW" altLang="en-US" smtClean="0"/>
+              <a:rPr lang="zh-TW" altLang="en-US"/>
               <a:t>第三層</a:t>
             </a:r>
           </a:p>
           <a:p>
             <a:pPr lvl="3"/>
             <a:r>
-              <a:rPr lang="zh-TW" altLang="en-US" smtClean="0"/>
+              <a:rPr lang="zh-TW" altLang="en-US"/>
               <a:t>第四層</a:t>
             </a:r>
           </a:p>
           <a:p>
             <a:pPr lvl="4"/>
             <a:r>
-              <a:rPr lang="zh-TW" altLang="en-US" smtClean="0"/>
+              <a:rPr lang="zh-TW" altLang="en-US"/>
               <a:t>第五層</a:t>
             </a:r>
-            <a:endParaRPr lang="zh-TW" altLang="en-US"/>
           </a:p>
         </p:txBody>
       </p:sp>
@@ -5896,10 +5638,9 @@
           <a:lstStyle/>
           <a:p>
             <a:r>
-              <a:rPr lang="zh-TW" altLang="en-US" smtClean="0"/>
+              <a:rPr lang="zh-TW" altLang="en-US"/>
               <a:t>按一下以編輯母片標題樣式</a:t>
             </a:r>
-            <a:endParaRPr lang="zh-TW" altLang="en-US"/>
           </a:p>
         </p:txBody>
       </p:sp>
@@ -5962,7 +5703,7 @@
           <a:p>
             <a:pPr lvl="0"/>
             <a:r>
-              <a:rPr lang="zh-TW" altLang="en-US" smtClean="0"/>
+              <a:rPr lang="zh-TW" altLang="en-US"/>
               <a:t>按一下以編輯母片文字樣式</a:t>
             </a:r>
           </a:p>
@@ -5990,38 +5731,37 @@
           <a:p>
             <a:pPr lvl="0"/>
             <a:r>
-              <a:rPr lang="zh-TW" altLang="en-US" smtClean="0"/>
+              <a:rPr lang="zh-TW" altLang="en-US"/>
               <a:t>按一下以編輯母片文字樣式</a:t>
             </a:r>
           </a:p>
           <a:p>
             <a:pPr lvl="1"/>
             <a:r>
-              <a:rPr lang="zh-TW" altLang="en-US" smtClean="0"/>
+              <a:rPr lang="zh-TW" altLang="en-US"/>
               <a:t>第二層</a:t>
             </a:r>
           </a:p>
           <a:p>
             <a:pPr lvl="2"/>
             <a:r>
-              <a:rPr lang="zh-TW" altLang="en-US" smtClean="0"/>
+              <a:rPr lang="zh-TW" altLang="en-US"/>
               <a:t>第三層</a:t>
             </a:r>
           </a:p>
           <a:p>
             <a:pPr lvl="3"/>
             <a:r>
-              <a:rPr lang="zh-TW" altLang="en-US" smtClean="0"/>
+              <a:rPr lang="zh-TW" altLang="en-US"/>
               <a:t>第四層</a:t>
             </a:r>
           </a:p>
           <a:p>
             <a:pPr lvl="4"/>
             <a:r>
-              <a:rPr lang="zh-TW" altLang="en-US" smtClean="0"/>
+              <a:rPr lang="zh-TW" altLang="en-US"/>
               <a:t>第五層</a:t>
             </a:r>
-            <a:endParaRPr lang="zh-TW" altLang="en-US"/>
           </a:p>
         </p:txBody>
       </p:sp>
@@ -6084,7 +5824,7 @@
           <a:p>
             <a:pPr lvl="0"/>
             <a:r>
-              <a:rPr lang="zh-TW" altLang="en-US" smtClean="0"/>
+              <a:rPr lang="zh-TW" altLang="en-US"/>
               <a:t>按一下以編輯母片文字樣式</a:t>
             </a:r>
           </a:p>
@@ -6112,38 +5852,37 @@
           <a:p>
             <a:pPr lvl="0"/>
             <a:r>
-              <a:rPr lang="zh-TW" altLang="en-US" smtClean="0"/>
+              <a:rPr lang="zh-TW" altLang="en-US"/>
               <a:t>按一下以編輯母片文字樣式</a:t>
             </a:r>
           </a:p>
           <a:p>
             <a:pPr lvl="1"/>
             <a:r>
-              <a:rPr lang="zh-TW" altLang="en-US" smtClean="0"/>
+              <a:rPr lang="zh-TW" altLang="en-US"/>
               <a:t>第二層</a:t>
             </a:r>
           </a:p>
           <a:p>
             <a:pPr lvl="2"/>
             <a:r>
-              <a:rPr lang="zh-TW" altLang="en-US" smtClean="0"/>
+              <a:rPr lang="zh-TW" altLang="en-US"/>
               <a:t>第三層</a:t>
             </a:r>
           </a:p>
           <a:p>
             <a:pPr lvl="3"/>
             <a:r>
-              <a:rPr lang="zh-TW" altLang="en-US" smtClean="0"/>
+              <a:rPr lang="zh-TW" altLang="en-US"/>
               <a:t>第四層</a:t>
             </a:r>
           </a:p>
           <a:p>
             <a:pPr lvl="4"/>
             <a:r>
-              <a:rPr lang="zh-TW" altLang="en-US" smtClean="0"/>
+              <a:rPr lang="zh-TW" altLang="en-US"/>
               <a:t>第五層</a:t>
             </a:r>
-            <a:endParaRPr lang="zh-TW" altLang="en-US"/>
           </a:p>
         </p:txBody>
       </p:sp>
@@ -6284,10 +6023,9 @@
           <a:lstStyle/>
           <a:p>
             <a:r>
-              <a:rPr lang="zh-TW" altLang="en-US" smtClean="0"/>
+              <a:rPr lang="zh-TW" altLang="en-US"/>
               <a:t>按一下以編輯母片標題樣式</a:t>
             </a:r>
-            <a:endParaRPr lang="zh-TW" altLang="en-US"/>
           </a:p>
         </p:txBody>
       </p:sp>
@@ -6558,10 +6296,9 @@
           </a:lstStyle>
           <a:p>
             <a:r>
-              <a:rPr lang="zh-TW" altLang="en-US" smtClean="0"/>
+              <a:rPr lang="zh-TW" altLang="en-US"/>
               <a:t>按一下以編輯母片標題樣式</a:t>
             </a:r>
-            <a:endParaRPr lang="zh-TW" altLang="en-US"/>
           </a:p>
         </p:txBody>
       </p:sp>
@@ -6615,38 +6352,37 @@
           <a:p>
             <a:pPr lvl="0"/>
             <a:r>
-              <a:rPr lang="zh-TW" altLang="en-US" smtClean="0"/>
+              <a:rPr lang="zh-TW" altLang="en-US"/>
               <a:t>按一下以編輯母片文字樣式</a:t>
             </a:r>
           </a:p>
           <a:p>
             <a:pPr lvl="1"/>
             <a:r>
-              <a:rPr lang="zh-TW" altLang="en-US" smtClean="0"/>
+              <a:rPr lang="zh-TW" altLang="en-US"/>
               <a:t>第二層</a:t>
             </a:r>
           </a:p>
           <a:p>
             <a:pPr lvl="2"/>
             <a:r>
-              <a:rPr lang="zh-TW" altLang="en-US" smtClean="0"/>
+              <a:rPr lang="zh-TW" altLang="en-US"/>
               <a:t>第三層</a:t>
             </a:r>
           </a:p>
           <a:p>
             <a:pPr lvl="3"/>
             <a:r>
-              <a:rPr lang="zh-TW" altLang="en-US" smtClean="0"/>
+              <a:rPr lang="zh-TW" altLang="en-US"/>
               <a:t>第四層</a:t>
             </a:r>
           </a:p>
           <a:p>
             <a:pPr lvl="4"/>
             <a:r>
-              <a:rPr lang="zh-TW" altLang="en-US" smtClean="0"/>
+              <a:rPr lang="zh-TW" altLang="en-US"/>
               <a:t>第五層</a:t>
             </a:r>
-            <a:endParaRPr lang="zh-TW" altLang="en-US"/>
           </a:p>
         </p:txBody>
       </p:sp>
@@ -6709,7 +6445,7 @@
           <a:p>
             <a:pPr lvl="0"/>
             <a:r>
-              <a:rPr lang="zh-TW" altLang="en-US" smtClean="0"/>
+              <a:rPr lang="zh-TW" altLang="en-US"/>
               <a:t>按一下以編輯母片文字樣式</a:t>
             </a:r>
           </a:p>
@@ -6861,10 +6597,9 @@
           </a:lstStyle>
           <a:p>
             <a:r>
-              <a:rPr lang="zh-TW" altLang="en-US" smtClean="0"/>
+              <a:rPr lang="zh-TW" altLang="en-US"/>
               <a:t>按一下以編輯母片標題樣式</a:t>
             </a:r>
-            <a:endParaRPr lang="zh-TW" altLang="en-US"/>
           </a:p>
         </p:txBody>
       </p:sp>
@@ -6926,7 +6661,7 @@
           </a:lstStyle>
           <a:p>
             <a:pPr lvl="0"/>
-            <a:endParaRPr lang="zh-TW" altLang="en-US" noProof="0" smtClean="0"/>
+            <a:endParaRPr lang="zh-TW" altLang="en-US" noProof="0"/>
           </a:p>
         </p:txBody>
       </p:sp>
@@ -6989,7 +6724,7 @@
           <a:p>
             <a:pPr lvl="0"/>
             <a:r>
-              <a:rPr lang="zh-TW" altLang="en-US" smtClean="0"/>
+              <a:rPr lang="zh-TW" altLang="en-US"/>
               <a:t>按一下以編輯母片文字樣式</a:t>
             </a:r>
           </a:p>
@@ -7696,7 +7431,7 @@
           <a:p>
             <a:pPr lvl="0"/>
             <a:r>
-              <a:rPr lang="zh-TW" altLang="en-GB" smtClean="0"/>
+              <a:rPr lang="zh-TW" altLang="en-GB"/>
               <a:t>請按一下滑鼠，編輯標題文的格式。</a:t>
             </a:r>
           </a:p>
@@ -8034,63 +7769,63 @@
           <a:p>
             <a:pPr lvl="0"/>
             <a:r>
-              <a:rPr lang="zh-TW" altLang="en-GB" smtClean="0"/>
+              <a:rPr lang="zh-TW" altLang="en-GB"/>
               <a:t>請按滑鼠，編輯大綱文字格式。</a:t>
             </a:r>
           </a:p>
           <a:p>
             <a:pPr lvl="1"/>
             <a:r>
-              <a:rPr lang="zh-TW" altLang="en-GB" smtClean="0"/>
+              <a:rPr lang="zh-TW" altLang="en-GB"/>
               <a:t>第二個大綱層次</a:t>
             </a:r>
           </a:p>
           <a:p>
             <a:pPr lvl="2"/>
             <a:r>
-              <a:rPr lang="zh-TW" altLang="en-GB" smtClean="0"/>
+              <a:rPr lang="zh-TW" altLang="en-GB"/>
               <a:t>第三個大綱層次</a:t>
             </a:r>
           </a:p>
           <a:p>
             <a:pPr lvl="3"/>
             <a:r>
-              <a:rPr lang="zh-TW" altLang="en-GB" smtClean="0"/>
+              <a:rPr lang="zh-TW" altLang="en-GB"/>
               <a:t>第四個大綱層次</a:t>
             </a:r>
           </a:p>
           <a:p>
             <a:pPr lvl="4"/>
             <a:r>
-              <a:rPr lang="zh-TW" altLang="en-GB" smtClean="0"/>
+              <a:rPr lang="zh-TW" altLang="en-GB"/>
               <a:t>第五個大綱層次</a:t>
             </a:r>
           </a:p>
           <a:p>
             <a:pPr lvl="4"/>
             <a:r>
-              <a:rPr lang="zh-TW" altLang="en-GB" smtClean="0"/>
+              <a:rPr lang="zh-TW" altLang="en-GB"/>
               <a:t>第六個大綱層次</a:t>
             </a:r>
           </a:p>
           <a:p>
             <a:pPr lvl="4"/>
             <a:r>
-              <a:rPr lang="zh-TW" altLang="en-GB" smtClean="0"/>
+              <a:rPr lang="zh-TW" altLang="en-GB"/>
               <a:t>第七個大綱層次</a:t>
             </a:r>
           </a:p>
           <a:p>
             <a:pPr lvl="4"/>
             <a:r>
-              <a:rPr lang="zh-TW" altLang="en-GB" smtClean="0"/>
+              <a:rPr lang="zh-TW" altLang="en-GB"/>
               <a:t>第八個大綱層次</a:t>
             </a:r>
           </a:p>
           <a:p>
             <a:pPr lvl="4"/>
             <a:r>
-              <a:rPr lang="zh-TW" altLang="en-GB" smtClean="0"/>
+              <a:rPr lang="zh-TW" altLang="en-GB"/>
               <a:t>第九個大綱層次</a:t>
             </a:r>
           </a:p>
@@ -9114,7 +8849,7 @@
           <a:p>
             <a:pPr lvl="0"/>
             <a:r>
-              <a:rPr lang="zh-TW" altLang="en-US" smtClean="0"/>
+              <a:rPr lang="zh-TW" altLang="en-US"/>
               <a:t>按一下以編輯母片標題樣式</a:t>
             </a:r>
           </a:p>
@@ -9182,35 +8917,35 @@
           <a:p>
             <a:pPr lvl="0"/>
             <a:r>
-              <a:rPr lang="zh-TW" altLang="en-US" smtClean="0"/>
+              <a:rPr lang="zh-TW" altLang="en-US"/>
               <a:t>按一下以編輯母片</a:t>
             </a:r>
           </a:p>
           <a:p>
             <a:pPr lvl="1"/>
             <a:r>
-              <a:rPr lang="zh-TW" altLang="en-US" smtClean="0"/>
+              <a:rPr lang="zh-TW" altLang="en-US"/>
               <a:t>第二層</a:t>
             </a:r>
           </a:p>
           <a:p>
             <a:pPr lvl="2"/>
             <a:r>
-              <a:rPr lang="zh-TW" altLang="en-US" smtClean="0"/>
+              <a:rPr lang="zh-TW" altLang="en-US"/>
               <a:t>第三層</a:t>
             </a:r>
           </a:p>
           <a:p>
             <a:pPr lvl="3"/>
             <a:r>
-              <a:rPr lang="zh-TW" altLang="en-US" smtClean="0"/>
+              <a:rPr lang="zh-TW" altLang="en-US"/>
               <a:t>第四層</a:t>
             </a:r>
           </a:p>
           <a:p>
             <a:pPr lvl="4"/>
             <a:r>
-              <a:rPr lang="zh-TW" altLang="en-US" smtClean="0"/>
+              <a:rPr lang="zh-TW" altLang="en-US"/>
               <a:t>第五層</a:t>
             </a:r>
           </a:p>
@@ -9966,7 +9701,7 @@
               </a:tabLst>
             </a:pPr>
             <a:r>
-              <a:rPr lang="en-US" altLang="zh-TW" smtClean="0"/>
+              <a:rPr lang="en-US" altLang="zh-TW"/>
               <a:t>Computer Organization Lab</a:t>
             </a:r>
           </a:p>
@@ -10009,7 +9744,7 @@
               </a:tabLst>
             </a:pPr>
             <a:r>
-              <a:rPr lang="en-US" altLang="zh-TW" smtClean="0"/>
+              <a:rPr lang="en-US" altLang="zh-TW"/>
               <a:t>Rules of the Game</a:t>
             </a:r>
           </a:p>
@@ -10085,7 +9820,7 @@
           <a:p>
             <a:pPr eaLnBrk="1" hangingPunct="1"/>
             <a:r>
-              <a:rPr lang="en-US" altLang="zh-TW" dirty="0" smtClean="0"/>
+              <a:rPr lang="en-US" altLang="zh-TW" dirty="0"/>
               <a:t>Where to get the course material</a:t>
             </a:r>
           </a:p>
@@ -10112,11 +9847,11 @@
           <a:lstStyle/>
           <a:p>
             <a:pPr eaLnBrk="1" hangingPunct="1"/>
-            <a:endParaRPr lang="en-US" altLang="zh-TW" sz="2400" dirty="0" smtClean="0"/>
+            <a:endParaRPr lang="en-US" altLang="zh-TW" sz="2400" dirty="0"/>
           </a:p>
           <a:p>
             <a:pPr eaLnBrk="1" hangingPunct="1"/>
-            <a:endParaRPr lang="en-US" altLang="zh-TW" sz="2400" dirty="0" smtClean="0"/>
+            <a:endParaRPr lang="en-US" altLang="zh-TW" sz="2400" dirty="0"/>
           </a:p>
           <a:p>
             <a:pPr eaLnBrk="1" hangingPunct="1"/>
@@ -10124,19 +9859,12 @@
               <a:rPr lang="en-US" altLang="zh-TW" sz="2400" dirty="0">
                 <a:hlinkClick r:id="rId2"/>
               </a:rPr>
-              <a:t>https://</a:t>
-            </a:r>
-            <a:r>
-              <a:rPr lang="en-US" altLang="zh-TW" sz="2400" dirty="0" smtClean="0">
-                <a:hlinkClick r:id="rId2"/>
-              </a:rPr>
-              <a:t>github.com/CGUSystemCourses/Comp_Org-2018</a:t>
-            </a:r>
-            <a:r>
-              <a:rPr lang="en-US" altLang="zh-TW" sz="2400" dirty="0" smtClean="0"/>
+              <a:t>https://github.com/CGUSystemCourses/Comp_Org-2018</a:t>
+            </a:r>
+            <a:r>
+              <a:rPr lang="en-US" altLang="zh-TW" sz="2400" dirty="0"/>
               <a:t> </a:t>
             </a:r>
-            <a:endParaRPr lang="en-US" altLang="zh-TW" sz="2400" dirty="0" smtClean="0"/>
           </a:p>
         </p:txBody>
       </p:sp>
@@ -10145,13 +9873,6 @@
   <p:clrMapOvr>
     <a:masterClrMapping/>
   </p:clrMapOvr>
-  <p:timing>
-    <p:tnLst>
-      <p:par>
-        <p:cTn id="1" dur="indefinite" restart="never" nodeType="tmRoot"/>
-      </p:par>
-    </p:tnLst>
-  </p:timing>
 </p:sld>
 </file>
 
@@ -10221,7 +9942,7 @@
               </a:tabLst>
             </a:pPr>
             <a:r>
-              <a:rPr lang="en-US" altLang="zh-TW" smtClean="0"/>
+              <a:rPr lang="en-US" altLang="zh-TW"/>
               <a:t>What you will learn from this lab</a:t>
             </a:r>
           </a:p>
@@ -10280,7 +10001,7 @@
               </a:tabLst>
             </a:pPr>
             <a:r>
-              <a:rPr lang="en-US" altLang="zh-TW" smtClean="0"/>
+              <a:rPr lang="en-US" altLang="zh-TW"/>
               <a:t>experience what I taught in the lecture</a:t>
             </a:r>
           </a:p>
@@ -10306,11 +10027,11 @@
               </a:tabLst>
             </a:pPr>
             <a:r>
-              <a:rPr lang="en-US" altLang="zh-TW" smtClean="0"/>
+              <a:rPr lang="en-US" altLang="zh-TW"/>
               <a:t>the </a:t>
             </a:r>
             <a:r>
-              <a:rPr lang="en-US" altLang="zh-TW" smtClean="0">
+              <a:rPr lang="en-US" altLang="zh-TW">
                 <a:solidFill>
                   <a:srgbClr val="FF0000"/>
                 </a:solidFill>
@@ -10318,7 +10039,7 @@
               <a:t>real exercise</a:t>
             </a:r>
             <a:r>
-              <a:rPr lang="en-US" altLang="zh-TW" smtClean="0"/>
+              <a:rPr lang="en-US" altLang="zh-TW"/>
               <a:t> of the computer organization course</a:t>
             </a:r>
           </a:p>
@@ -10343,7 +10064,7 @@
                 <a:tab pos="10055225" algn="l"/>
               </a:tabLst>
             </a:pPr>
-            <a:endParaRPr lang="en-US" altLang="zh-TW" smtClean="0"/>
+            <a:endParaRPr lang="en-US" altLang="zh-TW"/>
           </a:p>
           <a:p>
             <a:pPr marL="341313" indent="-341313" eaLnBrk="1" hangingPunct="1">
@@ -10367,11 +10088,11 @@
               </a:tabLst>
             </a:pPr>
             <a:r>
-              <a:rPr lang="en-US" altLang="zh-TW" smtClean="0"/>
+              <a:rPr lang="en-US" altLang="zh-TW"/>
               <a:t>do your circuit design </a:t>
             </a:r>
             <a:r>
-              <a:rPr lang="en-US" altLang="zh-TW" smtClean="0">
+              <a:rPr lang="en-US" altLang="zh-TW">
                 <a:solidFill>
                   <a:srgbClr val="FF0000"/>
                 </a:solidFill>
@@ -10379,7 +10100,7 @@
               <a:t>by yourself</a:t>
             </a:r>
             <a:r>
-              <a:rPr lang="en-US" altLang="zh-TW" smtClean="0"/>
+              <a:rPr lang="en-US" altLang="zh-TW"/>
               <a:t> and verify</a:t>
             </a:r>
           </a:p>
@@ -10405,7 +10126,7 @@
               </a:tabLst>
             </a:pPr>
             <a:r>
-              <a:rPr lang="en-US" altLang="zh-TW" smtClean="0">
+              <a:rPr lang="en-US" altLang="zh-TW">
                 <a:solidFill>
                   <a:srgbClr val="FF0000"/>
                 </a:solidFill>
@@ -10435,14 +10156,14 @@
               </a:tabLst>
             </a:pPr>
             <a:r>
-              <a:rPr lang="en-US" altLang="zh-TW" smtClean="0">
+              <a:rPr lang="en-US" altLang="zh-TW">
                 <a:solidFill>
                   <a:srgbClr val="FF0000"/>
                 </a:solidFill>
               </a:rPr>
               <a:t>You don’t have a cook-book!</a:t>
             </a:r>
-            <a:endParaRPr lang="en-US" altLang="zh-TW" smtClean="0"/>
+            <a:endParaRPr lang="en-US" altLang="zh-TW"/>
           </a:p>
           <a:p>
             <a:pPr marL="341313" indent="-341313" eaLnBrk="1" hangingPunct="1">
@@ -10465,7 +10186,7 @@
                 <a:tab pos="10055225" algn="l"/>
               </a:tabLst>
             </a:pPr>
-            <a:endParaRPr lang="en-US" altLang="zh-TW" smtClean="0"/>
+            <a:endParaRPr lang="en-US" altLang="zh-TW"/>
           </a:p>
         </p:txBody>
       </p:sp>
@@ -10571,7 +10292,7 @@
               </a:tabLst>
             </a:pPr>
             <a:r>
-              <a:rPr lang="en-US" altLang="zh-TW" smtClean="0"/>
+              <a:rPr lang="en-US" altLang="zh-TW"/>
               <a:t>Your best friend through out this course</a:t>
             </a:r>
           </a:p>
@@ -10633,8 +10354,12 @@
               </a:tabLst>
             </a:pPr>
             <a:r>
-              <a:rPr lang="en-US" altLang="zh-TW" dirty="0" smtClean="0"/>
-              <a:t>CIC-560 FPGA board</a:t>
+              <a:rPr lang="en-US" altLang="zh-TW" sz="2800" dirty="0" err="1"/>
+              <a:t>Terasic</a:t>
+            </a:r>
+            <a:r>
+              <a:rPr lang="en-US" altLang="zh-TW" sz="2800" dirty="0"/>
+              <a:t> DE2-115 FPGA experiment board</a:t>
             </a:r>
           </a:p>
           <a:p>
@@ -10661,7 +10386,7 @@
                 <a:tab pos="10055225" algn="l"/>
               </a:tabLst>
             </a:pPr>
-            <a:endParaRPr lang="en-US" altLang="zh-TW" dirty="0" smtClean="0"/>
+            <a:endParaRPr lang="en-US" altLang="zh-TW" sz="2800" dirty="0"/>
           </a:p>
           <a:p>
             <a:pPr marL="341313" indent="-341313" eaLnBrk="1" hangingPunct="1">
@@ -10689,12 +10414,8 @@
               </a:tabLst>
             </a:pPr>
             <a:r>
-              <a:rPr lang="en-US" altLang="zh-TW" dirty="0" err="1" smtClean="0"/>
-              <a:t>Quartus</a:t>
-            </a:r>
-            <a:r>
-              <a:rPr lang="en-US" altLang="zh-TW" dirty="0" smtClean="0"/>
-              <a:t> II (the Altera’s FPGA design software)</a:t>
+              <a:rPr lang="en-US" altLang="zh-TW" sz="2800" dirty="0"/>
+              <a:t>Quartus Prime (the Intel’s FPGA design software)</a:t>
             </a:r>
           </a:p>
           <a:p>
@@ -10722,7 +10443,7 @@
               </a:tabLst>
             </a:pPr>
             <a:r>
-              <a:rPr lang="en-US" altLang="zh-TW" dirty="0" smtClean="0"/>
+              <a:rPr lang="en-US" altLang="zh-TW" sz="2400" dirty="0"/>
               <a:t>download and install in your own computer</a:t>
             </a:r>
           </a:p>
@@ -10751,20 +10472,72 @@
               </a:tabLst>
             </a:pPr>
             <a:r>
-              <a:rPr lang="en-US" altLang="zh-TW" dirty="0">
+              <a:rPr lang="en-US" altLang="zh-TW" sz="2400" dirty="0">
                 <a:hlinkClick r:id="rId3"/>
               </a:rPr>
-              <a:t>https://</a:t>
-            </a:r>
-            <a:r>
-              <a:rPr lang="en-US" altLang="zh-TW" dirty="0" smtClean="0">
-                <a:hlinkClick r:id="rId3"/>
-              </a:rPr>
-              <a:t>www.altera.com/downloads/software/quartus-ii-we/91sp2.html</a:t>
-            </a:r>
-            <a:r>
-              <a:rPr lang="en-US" altLang="zh-TW" dirty="0" smtClean="0"/>
+              <a:t>http://fpgasoftware.intel.com/?edition=lite</a:t>
+            </a:r>
+            <a:r>
+              <a:rPr lang="en-US" altLang="zh-TW" sz="2400" dirty="0"/>
               <a:t> </a:t>
+            </a:r>
+          </a:p>
+          <a:p>
+            <a:pPr marL="741363" lvl="1" indent="-284163" eaLnBrk="1" hangingPunct="1">
+              <a:spcBef>
+                <a:spcPts val="600"/>
+              </a:spcBef>
+              <a:buClr>
+                <a:srgbClr val="FF0000"/>
+              </a:buClr>
+              <a:buFont typeface="Wingdings" panose="05000000000000000000" pitchFamily="2" charset="2"/>
+              <a:buChar char=""/>
+              <a:tabLst>
+                <a:tab pos="911225" algn="l"/>
+                <a:tab pos="1825625" algn="l"/>
+                <a:tab pos="2740025" algn="l"/>
+                <a:tab pos="3654425" algn="l"/>
+                <a:tab pos="4568825" algn="l"/>
+                <a:tab pos="5483225" algn="l"/>
+                <a:tab pos="6397625" algn="l"/>
+                <a:tab pos="7312025" algn="l"/>
+                <a:tab pos="8226425" algn="l"/>
+                <a:tab pos="9140825" algn="l"/>
+                <a:tab pos="10055225" algn="l"/>
+              </a:tabLst>
+            </a:pPr>
+            <a:r>
+              <a:rPr lang="en-US" altLang="zh-TW" sz="2400" dirty="0"/>
+              <a:t>Use Version 10.0 or later</a:t>
+            </a:r>
+          </a:p>
+          <a:p>
+            <a:pPr marL="741363" lvl="1" indent="-284163" eaLnBrk="1" hangingPunct="1">
+              <a:spcBef>
+                <a:spcPts val="600"/>
+              </a:spcBef>
+              <a:buClr>
+                <a:srgbClr val="FF0000"/>
+              </a:buClr>
+              <a:buFont typeface="Wingdings" panose="05000000000000000000" pitchFamily="2" charset="2"/>
+              <a:buChar char=""/>
+              <a:tabLst>
+                <a:tab pos="911225" algn="l"/>
+                <a:tab pos="1825625" algn="l"/>
+                <a:tab pos="2740025" algn="l"/>
+                <a:tab pos="3654425" algn="l"/>
+                <a:tab pos="4568825" algn="l"/>
+                <a:tab pos="5483225" algn="l"/>
+                <a:tab pos="6397625" algn="l"/>
+                <a:tab pos="7312025" algn="l"/>
+                <a:tab pos="8226425" algn="l"/>
+                <a:tab pos="9140825" algn="l"/>
+                <a:tab pos="10055225" algn="l"/>
+              </a:tabLst>
+            </a:pPr>
+            <a:r>
+              <a:rPr lang="en-US" altLang="zh-TW" sz="2400" dirty="0"/>
+              <a:t>Or you can copy the CD in the experiment board package</a:t>
             </a:r>
           </a:p>
         </p:txBody>
@@ -10871,7 +10644,7 @@
               </a:tabLst>
             </a:pPr>
             <a:r>
-              <a:rPr lang="en-US" altLang="zh-TW" smtClean="0"/>
+              <a:rPr lang="en-US" altLang="zh-TW"/>
               <a:t>Course Material</a:t>
             </a:r>
           </a:p>
@@ -10889,8 +10662,8 @@
         </p:nvSpPr>
         <p:spPr>
           <a:xfrm>
-            <a:off x="1182688" y="2017713"/>
-            <a:ext cx="7773987" cy="4116387"/>
+            <a:off x="683568" y="2017713"/>
+            <a:ext cx="8273107" cy="4116387"/>
           </a:xfrm>
           <a:extLst>
             <a:ext uri="{91240B29-F687-4F45-9708-019B960494DF}">
@@ -10930,7 +10703,7 @@
               </a:tabLst>
             </a:pPr>
             <a:r>
-              <a:rPr lang="en-US" altLang="zh-TW" sz="2800" smtClean="0"/>
+              <a:rPr lang="en-US" altLang="zh-TW" sz="2800" dirty="0"/>
               <a:t>my lab design documents (no textbook)</a:t>
             </a:r>
           </a:p>
@@ -10955,7 +10728,7 @@
                 <a:tab pos="10055225" algn="l"/>
               </a:tabLst>
             </a:pPr>
-            <a:endParaRPr lang="en-US" altLang="zh-TW" sz="2800" smtClean="0"/>
+            <a:endParaRPr lang="en-US" altLang="zh-TW" sz="2800" dirty="0"/>
           </a:p>
           <a:p>
             <a:pPr marL="341313" indent="-341313" eaLnBrk="1" hangingPunct="1">
@@ -10979,7 +10752,7 @@
               </a:tabLst>
             </a:pPr>
             <a:r>
-              <a:rPr lang="en-US" altLang="zh-TW" sz="2800" smtClean="0"/>
+              <a:rPr lang="en-US" altLang="zh-TW" sz="2800" dirty="0"/>
               <a:t>Reference:</a:t>
             </a:r>
           </a:p>
@@ -11005,8 +10778,8 @@
               </a:tabLst>
             </a:pPr>
             <a:r>
-              <a:rPr lang="en-US" altLang="zh-TW" sz="2400" smtClean="0"/>
-              <a:t>Altera documents</a:t>
+              <a:rPr lang="en-US" altLang="zh-TW" sz="2400" dirty="0"/>
+              <a:t>textbook and references of computer organization course</a:t>
             </a:r>
           </a:p>
           <a:p>
@@ -11031,8 +10804,8 @@
               </a:tabLst>
             </a:pPr>
             <a:r>
-              <a:rPr lang="en-US" altLang="zh-TW" sz="2400" smtClean="0"/>
-              <a:t>textbook and references of computer organization course</a:t>
+              <a:rPr lang="en-US" altLang="zh-TW" sz="2400" dirty="0"/>
+              <a:t>The documents in the CD of our experiment board package</a:t>
             </a:r>
           </a:p>
           <a:p>
@@ -11057,34 +10830,14 @@
               </a:tabLst>
             </a:pPr>
             <a:r>
-              <a:rPr lang="en-US" altLang="zh-TW" sz="2400" smtClean="0"/>
-              <a:t>林容益, FPGA數位IC電路設計應用及實驗</a:t>
-            </a:r>
-          </a:p>
-          <a:p>
-            <a:pPr lvl="2" eaLnBrk="1" hangingPunct="1">
-              <a:buClr>
-                <a:srgbClr val="3333CC"/>
-              </a:buClr>
-              <a:buFont typeface="Wingdings" panose="05000000000000000000" pitchFamily="2" charset="2"/>
-              <a:buChar char=""/>
-              <a:tabLst>
-                <a:tab pos="911225" algn="l"/>
-                <a:tab pos="1825625" algn="l"/>
-                <a:tab pos="2740025" algn="l"/>
-                <a:tab pos="3654425" algn="l"/>
-                <a:tab pos="4568825" algn="l"/>
-                <a:tab pos="5483225" algn="l"/>
-                <a:tab pos="6397625" algn="l"/>
-                <a:tab pos="7312025" algn="l"/>
-                <a:tab pos="8226425" algn="l"/>
-                <a:tab pos="9140825" algn="l"/>
-                <a:tab pos="10055225" algn="l"/>
-              </a:tabLst>
-            </a:pPr>
-            <a:r>
-              <a:rPr lang="en-US" altLang="zh-TW" sz="2000" smtClean="0"/>
-              <a:t>only the schematic diagram of the experiment board is useful</a:t>
+              <a:rPr lang="en-US" altLang="zh-TW" sz="2000" dirty="0">
+                <a:hlinkClick r:id="rId3"/>
+              </a:rPr>
+              <a:t>https://www.terasic.com.tw/cgi-bin/page/archive.pl?Language=English&amp;CategoryNo=139&amp;No=502</a:t>
+            </a:r>
+            <a:r>
+              <a:rPr lang="en-US" altLang="zh-TW" sz="2000" dirty="0"/>
+              <a:t> </a:t>
             </a:r>
           </a:p>
         </p:txBody>
@@ -11191,7 +10944,7 @@
               </a:tabLst>
             </a:pPr>
             <a:r>
-              <a:rPr lang="en-US" altLang="zh-TW" smtClean="0"/>
+              <a:rPr lang="en-US" altLang="zh-TW"/>
               <a:t>Grading</a:t>
             </a:r>
           </a:p>
@@ -11250,7 +11003,7 @@
               </a:tabLst>
             </a:pPr>
             <a:r>
-              <a:rPr lang="en-US" altLang="zh-TW" smtClean="0"/>
+              <a:rPr lang="en-US" altLang="zh-TW"/>
               <a:t>Lab demo and report: 30%</a:t>
             </a:r>
           </a:p>
@@ -11275,7 +11028,7 @@
                 <a:tab pos="10055225" algn="l"/>
               </a:tabLst>
             </a:pPr>
-            <a:endParaRPr lang="en-US" altLang="zh-TW" smtClean="0"/>
+            <a:endParaRPr lang="en-US" altLang="zh-TW"/>
           </a:p>
           <a:p>
             <a:pPr marL="341313" indent="-341313" eaLnBrk="1" hangingPunct="1">
@@ -11299,7 +11052,7 @@
               </a:tabLst>
             </a:pPr>
             <a:r>
-              <a:rPr lang="en-US" altLang="zh-TW" smtClean="0"/>
+              <a:rPr lang="en-US" altLang="zh-TW"/>
               <a:t>Mid-term project: 30%</a:t>
             </a:r>
           </a:p>
@@ -11324,7 +11077,7 @@
                 <a:tab pos="10055225" algn="l"/>
               </a:tabLst>
             </a:pPr>
-            <a:endParaRPr lang="en-US" altLang="zh-TW" smtClean="0"/>
+            <a:endParaRPr lang="en-US" altLang="zh-TW"/>
           </a:p>
           <a:p>
             <a:pPr marL="341313" indent="-341313" eaLnBrk="1" hangingPunct="1">
@@ -11348,7 +11101,7 @@
               </a:tabLst>
             </a:pPr>
             <a:r>
-              <a:rPr lang="en-US" altLang="zh-TW" smtClean="0"/>
+              <a:rPr lang="en-US" altLang="zh-TW"/>
               <a:t>Final project: 30%</a:t>
             </a:r>
           </a:p>
@@ -11373,7 +11126,7 @@
                 <a:tab pos="10055225" algn="l"/>
               </a:tabLst>
             </a:pPr>
-            <a:endParaRPr lang="en-US" altLang="zh-TW" smtClean="0"/>
+            <a:endParaRPr lang="en-US" altLang="zh-TW"/>
           </a:p>
           <a:p>
             <a:pPr marL="341313" indent="-341313" eaLnBrk="1" hangingPunct="1">
@@ -11397,7 +11150,7 @@
               </a:tabLst>
             </a:pPr>
             <a:r>
-              <a:rPr lang="en-US" altLang="zh-TW" smtClean="0"/>
+              <a:rPr lang="en-US" altLang="zh-TW"/>
               <a:t>Pre-lab report: 10%</a:t>
             </a:r>
           </a:p>
@@ -11458,7 +11211,7 @@
       </p:grpSpPr>
       <p:sp>
         <p:nvSpPr>
-          <p:cNvPr id="16386" name="Rectangle 1"/>
+          <p:cNvPr id="20482" name="Rectangle 1"/>
           <p:cNvSpPr>
             <a:spLocks noGrp="1" noChangeArrowheads="1"/>
           </p:cNvSpPr>
@@ -11505,680 +11258,7 @@
               </a:tabLst>
             </a:pPr>
             <a:r>
-              <a:rPr lang="en-US" altLang="zh-TW" smtClean="0"/>
-              <a:t>Next: Lab01</a:t>
-            </a:r>
-          </a:p>
-        </p:txBody>
-      </p:sp>
-      <p:sp>
-        <p:nvSpPr>
-          <p:cNvPr id="16387" name="Rectangle 2"/>
-          <p:cNvSpPr>
-            <a:spLocks noGrp="1" noChangeArrowheads="1"/>
-          </p:cNvSpPr>
-          <p:nvPr>
-            <p:ph type="body" idx="1"/>
-          </p:nvPr>
-        </p:nvSpPr>
-        <p:spPr>
-          <a:xfrm>
-            <a:off x="1182688" y="2017713"/>
-            <a:ext cx="7773987" cy="4116387"/>
-          </a:xfrm>
-          <a:extLst>
-            <a:ext uri="{91240B29-F687-4F45-9708-019B960494DF}">
-              <a14:hiddenLine xmlns:a14="http://schemas.microsoft.com/office/drawing/2010/main" w="9525">
-                <a:solidFill>
-                  <a:srgbClr val="000000"/>
-                </a:solidFill>
-                <a:round/>
-                <a:headEnd/>
-                <a:tailEnd/>
-              </a14:hiddenLine>
-            </a:ext>
-          </a:extLst>
-        </p:spPr>
-        <p:txBody>
-          <a:bodyPr lIns="90000" tIns="46800" rIns="90000" bIns="46800"/>
-          <a:lstStyle/>
-          <a:p>
-            <a:pPr marL="341313" indent="-341313" eaLnBrk="1" hangingPunct="1">
-              <a:spcBef>
-                <a:spcPts val="700"/>
-              </a:spcBef>
-              <a:buClr>
-                <a:srgbClr val="3333CC"/>
-              </a:buClr>
-              <a:buFont typeface="Wingdings" panose="05000000000000000000" pitchFamily="2" charset="2"/>
-              <a:buChar char=""/>
-              <a:tabLst>
-                <a:tab pos="911225" algn="l"/>
-                <a:tab pos="1825625" algn="l"/>
-                <a:tab pos="2740025" algn="l"/>
-                <a:tab pos="3654425" algn="l"/>
-                <a:tab pos="4568825" algn="l"/>
-                <a:tab pos="5483225" algn="l"/>
-                <a:tab pos="6397625" algn="l"/>
-                <a:tab pos="7312025" algn="l"/>
-                <a:tab pos="8226425" algn="l"/>
-                <a:tab pos="9140825" algn="l"/>
-                <a:tab pos="10055225" algn="l"/>
-              </a:tabLst>
-            </a:pPr>
-            <a:r>
-              <a:rPr lang="en-US" altLang="zh-TW" sz="2800" smtClean="0"/>
-              <a:t>learn how to work with the experiment environment</a:t>
-            </a:r>
-          </a:p>
-          <a:p>
-            <a:pPr marL="741363" lvl="1" indent="-284163" eaLnBrk="1" hangingPunct="1">
-              <a:spcBef>
-                <a:spcPts val="600"/>
-              </a:spcBef>
-              <a:buClr>
-                <a:srgbClr val="FF0000"/>
-              </a:buClr>
-              <a:buFont typeface="Wingdings" panose="05000000000000000000" pitchFamily="2" charset="2"/>
-              <a:buChar char=""/>
-              <a:tabLst>
-                <a:tab pos="911225" algn="l"/>
-                <a:tab pos="1825625" algn="l"/>
-                <a:tab pos="2740025" algn="l"/>
-                <a:tab pos="3654425" algn="l"/>
-                <a:tab pos="4568825" algn="l"/>
-                <a:tab pos="5483225" algn="l"/>
-                <a:tab pos="6397625" algn="l"/>
-                <a:tab pos="7312025" algn="l"/>
-                <a:tab pos="8226425" algn="l"/>
-                <a:tab pos="9140825" algn="l"/>
-                <a:tab pos="10055225" algn="l"/>
-              </a:tabLst>
-            </a:pPr>
-            <a:r>
-              <a:rPr lang="en-US" altLang="zh-TW" sz="2400" smtClean="0"/>
-              <a:t>FPGA board CIC560</a:t>
-            </a:r>
-          </a:p>
-          <a:p>
-            <a:pPr marL="741363" lvl="1" indent="-284163" eaLnBrk="1" hangingPunct="1">
-              <a:spcBef>
-                <a:spcPts val="600"/>
-              </a:spcBef>
-              <a:buClr>
-                <a:srgbClr val="FF0000"/>
-              </a:buClr>
-              <a:buFont typeface="Wingdings" panose="05000000000000000000" pitchFamily="2" charset="2"/>
-              <a:buChar char=""/>
-              <a:tabLst>
-                <a:tab pos="911225" algn="l"/>
-                <a:tab pos="1825625" algn="l"/>
-                <a:tab pos="2740025" algn="l"/>
-                <a:tab pos="3654425" algn="l"/>
-                <a:tab pos="4568825" algn="l"/>
-                <a:tab pos="5483225" algn="l"/>
-                <a:tab pos="6397625" algn="l"/>
-                <a:tab pos="7312025" algn="l"/>
-                <a:tab pos="8226425" algn="l"/>
-                <a:tab pos="9140825" algn="l"/>
-                <a:tab pos="10055225" algn="l"/>
-              </a:tabLst>
-            </a:pPr>
-            <a:r>
-              <a:rPr lang="en-US" altLang="zh-TW" sz="2400" smtClean="0"/>
-              <a:t>QuartusII software</a:t>
-            </a:r>
-          </a:p>
-          <a:p>
-            <a:pPr marL="741363" lvl="1" indent="-284163" eaLnBrk="1" hangingPunct="1">
-              <a:spcBef>
-                <a:spcPts val="600"/>
-              </a:spcBef>
-              <a:buClr>
-                <a:srgbClr val="FF0000"/>
-              </a:buClr>
-              <a:buFont typeface="Wingdings" panose="05000000000000000000" pitchFamily="2" charset="2"/>
-              <a:buChar char=""/>
-              <a:tabLst>
-                <a:tab pos="911225" algn="l"/>
-                <a:tab pos="1825625" algn="l"/>
-                <a:tab pos="2740025" algn="l"/>
-                <a:tab pos="3654425" algn="l"/>
-                <a:tab pos="4568825" algn="l"/>
-                <a:tab pos="5483225" algn="l"/>
-                <a:tab pos="6397625" algn="l"/>
-                <a:tab pos="7312025" algn="l"/>
-                <a:tab pos="8226425" algn="l"/>
-                <a:tab pos="9140825" algn="l"/>
-                <a:tab pos="10055225" algn="l"/>
-              </a:tabLst>
-            </a:pPr>
-            <a:endParaRPr lang="en-US" altLang="zh-TW" sz="2400" smtClean="0"/>
-          </a:p>
-          <a:p>
-            <a:pPr marL="341313" indent="-341313" eaLnBrk="1" hangingPunct="1">
-              <a:spcBef>
-                <a:spcPts val="700"/>
-              </a:spcBef>
-              <a:buClr>
-                <a:srgbClr val="3333CC"/>
-              </a:buClr>
-              <a:buFont typeface="Wingdings" panose="05000000000000000000" pitchFamily="2" charset="2"/>
-              <a:buChar char=""/>
-              <a:tabLst>
-                <a:tab pos="911225" algn="l"/>
-                <a:tab pos="1825625" algn="l"/>
-                <a:tab pos="2740025" algn="l"/>
-                <a:tab pos="3654425" algn="l"/>
-                <a:tab pos="4568825" algn="l"/>
-                <a:tab pos="5483225" algn="l"/>
-                <a:tab pos="6397625" algn="l"/>
-                <a:tab pos="7312025" algn="l"/>
-                <a:tab pos="8226425" algn="l"/>
-                <a:tab pos="9140825" algn="l"/>
-                <a:tab pos="10055225" algn="l"/>
-              </a:tabLst>
-            </a:pPr>
-            <a:r>
-              <a:rPr lang="en-US" altLang="zh-TW" sz="2800" smtClean="0"/>
-              <a:t>we will give you a circuit design and let you realize on FPGA</a:t>
-            </a:r>
-          </a:p>
-          <a:p>
-            <a:pPr marL="741363" lvl="1" indent="-284163" eaLnBrk="1" hangingPunct="1">
-              <a:spcBef>
-                <a:spcPts val="600"/>
-              </a:spcBef>
-              <a:buClr>
-                <a:srgbClr val="FF0000"/>
-              </a:buClr>
-              <a:buFont typeface="Wingdings" panose="05000000000000000000" pitchFamily="2" charset="2"/>
-              <a:buChar char=""/>
-              <a:tabLst>
-                <a:tab pos="911225" algn="l"/>
-                <a:tab pos="1825625" algn="l"/>
-                <a:tab pos="2740025" algn="l"/>
-                <a:tab pos="3654425" algn="l"/>
-                <a:tab pos="4568825" algn="l"/>
-                <a:tab pos="5483225" algn="l"/>
-                <a:tab pos="6397625" algn="l"/>
-                <a:tab pos="7312025" algn="l"/>
-                <a:tab pos="8226425" algn="l"/>
-                <a:tab pos="9140825" algn="l"/>
-                <a:tab pos="10055225" algn="l"/>
-              </a:tabLst>
-            </a:pPr>
-            <a:r>
-              <a:rPr lang="en-US" altLang="zh-TW" sz="2400" smtClean="0"/>
-              <a:t>the </a:t>
-            </a:r>
-            <a:r>
-              <a:rPr lang="en-US" altLang="zh-TW" sz="2400" smtClean="0">
-                <a:solidFill>
-                  <a:srgbClr val="FF0000"/>
-                </a:solidFill>
-              </a:rPr>
-              <a:t>only</a:t>
-            </a:r>
-            <a:r>
-              <a:rPr lang="en-US" altLang="zh-TW" sz="2400" smtClean="0"/>
-              <a:t> circuit design I gave you through out this semester</a:t>
-            </a:r>
-          </a:p>
-        </p:txBody>
-      </p:sp>
-    </p:spTree>
-  </p:cSld>
-  <p:clrMapOvr>
-    <a:masterClrMapping/>
-  </p:clrMapOvr>
-  <p:transition spd="med"/>
-  <p:timing>
-    <p:tnLst>
-      <p:par>
-        <p:cTn id="1" dur="indefinite" restart="never" nodeType="tmRoot">
-          <p:childTnLst>
-            <p:seq concurrent="1" nextAc="seek">
-              <p:cTn id="2" dur="0" nodeType="mainSeq"/>
-              <p:prevCondLst>
-                <p:cond evt="onPrev" delay="0">
-                  <p:tgtEl>
-                    <p:sldTgt/>
-                  </p:tgtEl>
-                </p:cond>
-              </p:prevCondLst>
-              <p:nextCondLst>
-                <p:cond evt="onNext" delay="0">
-                  <p:tgtEl>
-                    <p:sldTgt/>
-                  </p:tgtEl>
-                </p:cond>
-              </p:nextCondLst>
-            </p:seq>
-          </p:childTnLst>
-        </p:cTn>
-      </p:par>
-    </p:tnLst>
-  </p:timing>
-</p:sld>
-</file>
-
-<file path=ppt/slides/slide8.xml><?xml version="1.0" encoding="utf-8"?>
-<p:sld xmlns:a="http://schemas.openxmlformats.org/drawingml/2006/main" xmlns:r="http://schemas.openxmlformats.org/officeDocument/2006/relationships" xmlns:p="http://schemas.openxmlformats.org/presentationml/2006/main">
-  <p:cSld>
-    <p:spTree>
-      <p:nvGrpSpPr>
-        <p:cNvPr id="1" name=""/>
-        <p:cNvGrpSpPr/>
-        <p:nvPr/>
-      </p:nvGrpSpPr>
-      <p:grpSpPr>
-        <a:xfrm>
-          <a:off x="0" y="0"/>
-          <a:ext cx="0" cy="0"/>
-          <a:chOff x="0" y="0"/>
-          <a:chExt cx="0" cy="0"/>
-        </a:xfrm>
-      </p:grpSpPr>
-      <p:sp>
-        <p:nvSpPr>
-          <p:cNvPr id="18434" name="Rectangle 1"/>
-          <p:cNvSpPr>
-            <a:spLocks noGrp="1" noChangeArrowheads="1"/>
-          </p:cNvSpPr>
-          <p:nvPr>
-            <p:ph type="title"/>
-          </p:nvPr>
-        </p:nvSpPr>
-        <p:spPr>
-          <a:xfrm>
-            <a:off x="1150938" y="214313"/>
-            <a:ext cx="7794625" cy="1463675"/>
-          </a:xfrm>
-          <a:extLst>
-            <a:ext uri="{91240B29-F687-4F45-9708-019B960494DF}">
-              <a14:hiddenLine xmlns:a14="http://schemas.microsoft.com/office/drawing/2010/main" w="9525">
-                <a:solidFill>
-                  <a:srgbClr val="000000"/>
-                </a:solidFill>
-                <a:round/>
-                <a:headEnd/>
-                <a:tailEnd/>
-              </a14:hiddenLine>
-            </a:ext>
-          </a:extLst>
-        </p:spPr>
-        <p:txBody>
-          <a:bodyPr lIns="90000" tIns="46800" rIns="90000" bIns="46800"/>
-          <a:lstStyle/>
-          <a:p>
-            <a:pPr eaLnBrk="1" hangingPunct="1">
-              <a:tabLst>
-                <a:tab pos="0" algn="l"/>
-                <a:tab pos="914400" algn="l"/>
-                <a:tab pos="1828800" algn="l"/>
-                <a:tab pos="2743200" algn="l"/>
-                <a:tab pos="3657600" algn="l"/>
-                <a:tab pos="4572000" algn="l"/>
-                <a:tab pos="5486400" algn="l"/>
-                <a:tab pos="6400800" algn="l"/>
-                <a:tab pos="7315200" algn="l"/>
-                <a:tab pos="8229600" algn="l"/>
-                <a:tab pos="9144000" algn="l"/>
-                <a:tab pos="10058400" algn="l"/>
-              </a:tabLst>
-            </a:pPr>
-            <a:r>
-              <a:rPr lang="en-US" altLang="zh-TW" smtClean="0"/>
-              <a:t>What you have to do after this class</a:t>
-            </a:r>
-          </a:p>
-        </p:txBody>
-      </p:sp>
-      <p:sp>
-        <p:nvSpPr>
-          <p:cNvPr id="10242" name="Rectangle 2"/>
-          <p:cNvSpPr>
-            <a:spLocks noGrp="1" noChangeArrowheads="1"/>
-          </p:cNvSpPr>
-          <p:nvPr>
-            <p:ph type="body" idx="1"/>
-          </p:nvPr>
-        </p:nvSpPr>
-        <p:spPr>
-          <a:xfrm>
-            <a:off x="1182688" y="2017713"/>
-            <a:ext cx="7773987" cy="4116387"/>
-          </a:xfrm>
-          <a:extLst>
-            <a:ext uri="{91240B29-F687-4F45-9708-019B960494DF}">
-              <a14:hiddenLine xmlns:a14="http://schemas.microsoft.com/office/drawing/2010/main" w="9525">
-                <a:solidFill>
-                  <a:srgbClr val="000000"/>
-                </a:solidFill>
-                <a:round/>
-                <a:headEnd/>
-                <a:tailEnd/>
-              </a14:hiddenLine>
-            </a:ext>
-          </a:extLst>
-        </p:spPr>
-        <p:txBody>
-          <a:bodyPr lIns="90000" tIns="46800" rIns="90000" bIns="46800"/>
-          <a:lstStyle/>
-          <a:p>
-            <a:pPr marL="341313" indent="-341313" eaLnBrk="1" hangingPunct="1">
-              <a:lnSpc>
-                <a:spcPct val="80000"/>
-              </a:lnSpc>
-              <a:spcBef>
-                <a:spcPts val="700"/>
-              </a:spcBef>
-              <a:buClr>
-                <a:srgbClr val="3333CC"/>
-              </a:buClr>
-              <a:buFont typeface="Wingdings" panose="05000000000000000000" pitchFamily="2" charset="2"/>
-              <a:buChar char=""/>
-              <a:tabLst>
-                <a:tab pos="911225" algn="l"/>
-                <a:tab pos="1825625" algn="l"/>
-                <a:tab pos="2740025" algn="l"/>
-                <a:tab pos="3654425" algn="l"/>
-                <a:tab pos="4568825" algn="l"/>
-                <a:tab pos="5483225" algn="l"/>
-                <a:tab pos="6397625" algn="l"/>
-                <a:tab pos="7312025" algn="l"/>
-                <a:tab pos="8226425" algn="l"/>
-                <a:tab pos="9140825" algn="l"/>
-                <a:tab pos="10055225" algn="l"/>
-              </a:tabLst>
-              <a:defRPr/>
-            </a:pPr>
-            <a:r>
-              <a:rPr lang="en-US" altLang="zh-TW" sz="2800" dirty="0" smtClean="0"/>
-              <a:t>get the free software </a:t>
-            </a:r>
-            <a:r>
-              <a:rPr lang="en-US" altLang="zh-TW" sz="2800" dirty="0" err="1" smtClean="0"/>
-              <a:t>Quartus</a:t>
-            </a:r>
-            <a:r>
-              <a:rPr lang="en-US" altLang="zh-TW" sz="2800" dirty="0" smtClean="0"/>
-              <a:t> II</a:t>
-            </a:r>
-          </a:p>
-          <a:p>
-            <a:pPr marL="741363" lvl="1" indent="-284163" eaLnBrk="1" hangingPunct="1">
-              <a:lnSpc>
-                <a:spcPct val="80000"/>
-              </a:lnSpc>
-              <a:spcBef>
-                <a:spcPts val="600"/>
-              </a:spcBef>
-              <a:buClr>
-                <a:srgbClr val="FF0000"/>
-              </a:buClr>
-              <a:buFont typeface="Wingdings" panose="05000000000000000000" pitchFamily="2" charset="2"/>
-              <a:buChar char=""/>
-              <a:tabLst>
-                <a:tab pos="911225" algn="l"/>
-                <a:tab pos="1825625" algn="l"/>
-                <a:tab pos="2740025" algn="l"/>
-                <a:tab pos="3654425" algn="l"/>
-                <a:tab pos="4568825" algn="l"/>
-                <a:tab pos="5483225" algn="l"/>
-                <a:tab pos="6397625" algn="l"/>
-                <a:tab pos="7312025" algn="l"/>
-                <a:tab pos="8226425" algn="l"/>
-                <a:tab pos="9140825" algn="l"/>
-                <a:tab pos="10055225" algn="l"/>
-              </a:tabLst>
-              <a:defRPr/>
-            </a:pPr>
-            <a:r>
-              <a:rPr lang="en-US" altLang="zh-TW" sz="2400" dirty="0" smtClean="0">
-                <a:solidFill>
-                  <a:srgbClr val="FF0000"/>
-                </a:solidFill>
-                <a:hlinkClick r:id="rId3"/>
-              </a:rPr>
-              <a:t>http://www.altera.com/products/software/quartus-ii/web-edition/qts-we-index.html</a:t>
-            </a:r>
-          </a:p>
-          <a:p>
-            <a:pPr marL="741363" lvl="1" indent="-284163" eaLnBrk="1" hangingPunct="1">
-              <a:lnSpc>
-                <a:spcPct val="80000"/>
-              </a:lnSpc>
-              <a:spcBef>
-                <a:spcPts val="600"/>
-              </a:spcBef>
-              <a:buClr>
-                <a:srgbClr val="FF0000"/>
-              </a:buClr>
-              <a:buFont typeface="Wingdings" panose="05000000000000000000" pitchFamily="2" charset="2"/>
-              <a:buChar char=""/>
-              <a:tabLst>
-                <a:tab pos="911225" algn="l"/>
-                <a:tab pos="1825625" algn="l"/>
-                <a:tab pos="2740025" algn="l"/>
-                <a:tab pos="3654425" algn="l"/>
-                <a:tab pos="4568825" algn="l"/>
-                <a:tab pos="5483225" algn="l"/>
-                <a:tab pos="6397625" algn="l"/>
-                <a:tab pos="7312025" algn="l"/>
-                <a:tab pos="8226425" algn="l"/>
-                <a:tab pos="9140825" algn="l"/>
-                <a:tab pos="10055225" algn="l"/>
-              </a:tabLst>
-              <a:defRPr/>
-            </a:pPr>
-            <a:r>
-              <a:rPr lang="en-US" altLang="zh-TW" sz="2400" dirty="0" smtClean="0"/>
-              <a:t>the web-edition is free</a:t>
-            </a:r>
-          </a:p>
-          <a:p>
-            <a:pPr marL="741363" lvl="1" indent="-284163" eaLnBrk="1" hangingPunct="1">
-              <a:lnSpc>
-                <a:spcPct val="80000"/>
-              </a:lnSpc>
-              <a:spcBef>
-                <a:spcPts val="600"/>
-              </a:spcBef>
-              <a:buClr>
-                <a:srgbClr val="FF0000"/>
-              </a:buClr>
-              <a:buFont typeface="Wingdings" panose="05000000000000000000" pitchFamily="2" charset="2"/>
-              <a:buChar char=""/>
-              <a:tabLst>
-                <a:tab pos="911225" algn="l"/>
-                <a:tab pos="1825625" algn="l"/>
-                <a:tab pos="2740025" algn="l"/>
-                <a:tab pos="3654425" algn="l"/>
-                <a:tab pos="4568825" algn="l"/>
-                <a:tab pos="5483225" algn="l"/>
-                <a:tab pos="6397625" algn="l"/>
-                <a:tab pos="7312025" algn="l"/>
-                <a:tab pos="8226425" algn="l"/>
-                <a:tab pos="9140825" algn="l"/>
-                <a:tab pos="10055225" algn="l"/>
-              </a:tabLst>
-              <a:defRPr/>
-            </a:pPr>
-            <a:r>
-              <a:rPr lang="en-US" altLang="zh-TW" sz="2400" dirty="0" smtClean="0"/>
-              <a:t>you can do your circuit design at home</a:t>
-            </a:r>
-          </a:p>
-          <a:p>
-            <a:pPr marL="0" indent="0" eaLnBrk="1" hangingPunct="1">
-              <a:lnSpc>
-                <a:spcPct val="80000"/>
-              </a:lnSpc>
-              <a:spcBef>
-                <a:spcPts val="700"/>
-              </a:spcBef>
-              <a:buClr>
-                <a:srgbClr val="3333CC"/>
-              </a:buClr>
-              <a:buFont typeface="Wingdings" panose="05000000000000000000" pitchFamily="2" charset="2"/>
-              <a:buNone/>
-              <a:tabLst>
-                <a:tab pos="911225" algn="l"/>
-                <a:tab pos="1825625" algn="l"/>
-                <a:tab pos="2740025" algn="l"/>
-                <a:tab pos="3654425" algn="l"/>
-                <a:tab pos="4568825" algn="l"/>
-                <a:tab pos="5483225" algn="l"/>
-                <a:tab pos="6397625" algn="l"/>
-                <a:tab pos="7312025" algn="l"/>
-                <a:tab pos="8226425" algn="l"/>
-                <a:tab pos="9140825" algn="l"/>
-                <a:tab pos="10055225" algn="l"/>
-              </a:tabLst>
-              <a:defRPr/>
-            </a:pPr>
-            <a:endParaRPr lang="en-US" altLang="zh-TW" sz="2800" dirty="0" smtClean="0"/>
-          </a:p>
-          <a:p>
-            <a:pPr marL="341313" indent="-341313" eaLnBrk="1" hangingPunct="1">
-              <a:lnSpc>
-                <a:spcPct val="80000"/>
-              </a:lnSpc>
-              <a:spcBef>
-                <a:spcPts val="700"/>
-              </a:spcBef>
-              <a:buClr>
-                <a:srgbClr val="3333CC"/>
-              </a:buClr>
-              <a:buFont typeface="Wingdings" panose="05000000000000000000" pitchFamily="2" charset="2"/>
-              <a:buChar char=""/>
-              <a:tabLst>
-                <a:tab pos="911225" algn="l"/>
-                <a:tab pos="1825625" algn="l"/>
-                <a:tab pos="2740025" algn="l"/>
-                <a:tab pos="3654425" algn="l"/>
-                <a:tab pos="4568825" algn="l"/>
-                <a:tab pos="5483225" algn="l"/>
-                <a:tab pos="6397625" algn="l"/>
-                <a:tab pos="7312025" algn="l"/>
-                <a:tab pos="8226425" algn="l"/>
-                <a:tab pos="9140825" algn="l"/>
-                <a:tab pos="10055225" algn="l"/>
-              </a:tabLst>
-              <a:defRPr/>
-            </a:pPr>
-            <a:r>
-              <a:rPr lang="en-US" altLang="zh-TW" sz="2800" dirty="0" smtClean="0"/>
-              <a:t>write your pre-lab report</a:t>
-            </a:r>
-          </a:p>
-        </p:txBody>
-      </p:sp>
-    </p:spTree>
-  </p:cSld>
-  <p:clrMapOvr>
-    <a:masterClrMapping/>
-  </p:clrMapOvr>
-  <p:transition spd="med"/>
-  <p:timing>
-    <p:tnLst>
-      <p:par>
-        <p:cTn id="1" dur="indefinite" restart="never" nodeType="tmRoot">
-          <p:childTnLst>
-            <p:seq concurrent="1" nextAc="seek">
-              <p:cTn id="2" dur="0" nodeType="mainSeq"/>
-              <p:prevCondLst>
-                <p:cond evt="onPrev" delay="0">
-                  <p:tgtEl>
-                    <p:sldTgt/>
-                  </p:tgtEl>
-                </p:cond>
-              </p:prevCondLst>
-              <p:nextCondLst>
-                <p:cond evt="onNext" delay="0">
-                  <p:tgtEl>
-                    <p:sldTgt/>
-                  </p:tgtEl>
-                </p:cond>
-              </p:nextCondLst>
-            </p:seq>
-          </p:childTnLst>
-        </p:cTn>
-      </p:par>
-    </p:tnLst>
-  </p:timing>
-</p:sld>
-</file>
-
-<file path=ppt/slides/slide9.xml><?xml version="1.0" encoding="utf-8"?>
-<p:sld xmlns:a="http://schemas.openxmlformats.org/drawingml/2006/main" xmlns:r="http://schemas.openxmlformats.org/officeDocument/2006/relationships" xmlns:p="http://schemas.openxmlformats.org/presentationml/2006/main">
-  <p:cSld>
-    <p:spTree>
-      <p:nvGrpSpPr>
-        <p:cNvPr id="1" name=""/>
-        <p:cNvGrpSpPr/>
-        <p:nvPr/>
-      </p:nvGrpSpPr>
-      <p:grpSpPr>
-        <a:xfrm>
-          <a:off x="0" y="0"/>
-          <a:ext cx="0" cy="0"/>
-          <a:chOff x="0" y="0"/>
-          <a:chExt cx="0" cy="0"/>
-        </a:xfrm>
-      </p:grpSpPr>
-      <p:sp>
-        <p:nvSpPr>
-          <p:cNvPr id="20482" name="Rectangle 1"/>
-          <p:cNvSpPr>
-            <a:spLocks noGrp="1" noChangeArrowheads="1"/>
-          </p:cNvSpPr>
-          <p:nvPr>
-            <p:ph type="title"/>
-          </p:nvPr>
-        </p:nvSpPr>
-        <p:spPr>
-          <a:xfrm>
-            <a:off x="1150938" y="214313"/>
-            <a:ext cx="7794625" cy="1463675"/>
-          </a:xfrm>
-          <a:extLst>
-            <a:ext uri="{91240B29-F687-4F45-9708-019B960494DF}">
-              <a14:hiddenLine xmlns:a14="http://schemas.microsoft.com/office/drawing/2010/main" w="9525">
-                <a:solidFill>
-                  <a:srgbClr val="000000"/>
-                </a:solidFill>
-                <a:round/>
-                <a:headEnd/>
-                <a:tailEnd/>
-              </a14:hiddenLine>
-            </a:ext>
-          </a:extLst>
-        </p:spPr>
-        <p:txBody>
-          <a:bodyPr lIns="90000" tIns="46800" rIns="90000" bIns="46800"/>
-          <a:lstStyle/>
-          <a:p>
-            <a:pPr eaLnBrk="1" hangingPunct="1">
-              <a:tabLst>
-                <a:tab pos="0" algn="l"/>
-                <a:tab pos="914400" algn="l"/>
-                <a:tab pos="1828800" algn="l"/>
-                <a:tab pos="2743200" algn="l"/>
-                <a:tab pos="3657600" algn="l"/>
-                <a:tab pos="4572000" algn="l"/>
-                <a:tab pos="5486400" algn="l"/>
-                <a:tab pos="6400800" algn="l"/>
-                <a:tab pos="7315200" algn="l"/>
-                <a:tab pos="8229600" algn="l"/>
-                <a:tab pos="9144000" algn="l"/>
-                <a:tab pos="10058400" algn="l"/>
-              </a:tabLst>
-            </a:pPr>
-            <a:r>
-              <a:rPr lang="en-US" altLang="zh-TW" smtClean="0"/>
+              <a:rPr lang="en-US" altLang="zh-TW"/>
               <a:t>Pre-Lab report</a:t>
             </a:r>
           </a:p>
@@ -12237,23 +11317,27 @@
               </a:tabLst>
             </a:pPr>
             <a:r>
-              <a:rPr lang="en-US" altLang="zh-TW" smtClean="0"/>
-              <a:t>Q1: 開發</a:t>
-            </a:r>
-            <a:r>
-              <a:rPr lang="zh-TW" altLang="en-US" smtClean="0"/>
+              <a:rPr lang="en-US" altLang="zh-TW" dirty="0"/>
+              <a:t>Q1: </a:t>
+            </a:r>
+            <a:r>
+              <a:rPr lang="en-US" altLang="zh-TW" dirty="0" err="1"/>
+              <a:t>開發</a:t>
+            </a:r>
+            <a:r>
+              <a:rPr lang="zh-TW" altLang="en-US" dirty="0"/>
               <a:t>板上的 </a:t>
             </a:r>
             <a:r>
-              <a:rPr lang="en-US" altLang="zh-TW" smtClean="0"/>
+              <a:rPr lang="en-US" altLang="zh-TW" dirty="0"/>
               <a:t>FPGA</a:t>
             </a:r>
             <a:r>
-              <a:rPr lang="zh-TW" altLang="en-US" smtClean="0"/>
+              <a:rPr lang="zh-TW" altLang="en-US" dirty="0"/>
               <a:t>型號 為何</a:t>
             </a:r>
             <a:r>
-              <a:rPr lang="en-US" altLang="zh-TW" smtClean="0"/>
+              <a:rPr lang="en-US" altLang="zh-TW" dirty="0"/>
               <a:t>?</a:t>
             </a:r>
           </a:p>
@@ -12279,8 +11363,24 @@
               </a:tabLst>
             </a:pPr>
             <a:r>
-              <a:rPr lang="en-US" altLang="zh-TW" smtClean="0"/>
-              <a:t>Q2: 簡述如何使用Quartus II 畫電路圖?</a:t>
+              <a:rPr lang="en-US" altLang="zh-TW" dirty="0"/>
+              <a:t>Q2: </a:t>
+            </a:r>
+            <a:r>
+              <a:rPr lang="en-US" altLang="zh-TW" dirty="0" err="1"/>
+              <a:t>簡述如何使用Quartus</a:t>
+            </a:r>
+            <a:r>
+              <a:rPr lang="en-US" altLang="zh-TW" dirty="0"/>
+              <a:t> </a:t>
+            </a:r>
+            <a:r>
+              <a:rPr lang="en-US" altLang="zh-TW" dirty="0" err="1"/>
+              <a:t>畫電路圖</a:t>
+            </a:r>
+            <a:r>
+              <a:rPr lang="en-US" altLang="zh-TW" dirty="0"/>
+              <a:t>?</a:t>
             </a:r>
           </a:p>
           <a:p>
@@ -12305,15 +11405,31 @@
               </a:tabLst>
             </a:pPr>
             <a:r>
-              <a:rPr lang="en-US" altLang="zh-TW" smtClean="0"/>
-              <a:t>Q3: 簡述如何使用 Quatrus II </a:t>
-            </a:r>
-            <a:r>
-              <a:rPr lang="zh-TW" altLang="en-US" smtClean="0"/>
+              <a:rPr lang="en-US" altLang="zh-TW" dirty="0"/>
+              <a:t>Q3: </a:t>
+            </a:r>
+            <a:r>
+              <a:rPr lang="en-US" altLang="zh-TW" dirty="0" err="1"/>
+              <a:t>簡述如何使用</a:t>
+            </a:r>
+            <a:r>
+              <a:rPr lang="en-US" altLang="zh-TW" dirty="0"/>
+              <a:t> </a:t>
+            </a:r>
+            <a:r>
+              <a:rPr lang="en-US" altLang="zh-TW" dirty="0" err="1"/>
+              <a:t>Quatrus</a:t>
+            </a:r>
+            <a:r>
+              <a:rPr lang="en-US" altLang="zh-TW" dirty="0"/>
+              <a:t> </a:t>
+            </a:r>
+            <a:r>
+              <a:rPr lang="zh-TW" altLang="en-US" dirty="0"/>
               <a:t>進行電路模擬並顯示波形圖</a:t>
             </a:r>
             <a:r>
-              <a:rPr lang="en-US" altLang="zh-TW" smtClean="0"/>
+              <a:rPr lang="en-US" altLang="zh-TW" dirty="0"/>
               <a:t>(waveform) ?</a:t>
             </a:r>
           </a:p>
@@ -12339,23 +11455,23 @@
               </a:tabLst>
             </a:pPr>
             <a:r>
-              <a:rPr lang="en-US" altLang="zh-TW" smtClean="0"/>
+              <a:rPr lang="en-US" altLang="zh-TW" dirty="0"/>
               <a:t>Q4: </a:t>
             </a:r>
             <a:r>
-              <a:rPr lang="zh-TW" altLang="en-US" smtClean="0"/>
+              <a:rPr lang="zh-TW" altLang="en-US" dirty="0"/>
               <a:t>什麼是 </a:t>
             </a:r>
             <a:r>
-              <a:rPr lang="en-US" altLang="zh-TW" smtClean="0"/>
+              <a:rPr lang="en-US" altLang="zh-TW" dirty="0"/>
               <a:t>FPGA (Field Programmable Gate Array)? </a:t>
             </a:r>
             <a:r>
-              <a:rPr lang="zh-TW" altLang="en-US" smtClean="0"/>
+              <a:rPr lang="zh-TW" altLang="en-US" dirty="0"/>
               <a:t>其功能與硬體架構為何</a:t>
             </a:r>
             <a:r>
-              <a:rPr lang="en-US" altLang="zh-TW" smtClean="0"/>
+              <a:rPr lang="en-US" altLang="zh-TW" dirty="0"/>
               <a:t>?</a:t>
             </a:r>
           </a:p>
@@ -12381,15 +11497,15 @@
               </a:tabLst>
             </a:pPr>
             <a:r>
-              <a:rPr lang="en-US" altLang="zh-TW" smtClean="0"/>
+              <a:rPr lang="en-US" altLang="zh-TW" dirty="0"/>
               <a:t>Q5: 當</a:t>
             </a:r>
             <a:r>
-              <a:rPr lang="zh-TW" altLang="en-US" smtClean="0"/>
+              <a:rPr lang="zh-TW" altLang="en-US" dirty="0"/>
               <a:t>電路出錯時，你會如何 </a:t>
             </a:r>
             <a:r>
-              <a:rPr lang="en-US" altLang="zh-TW" smtClean="0"/>
+              <a:rPr lang="en-US" altLang="zh-TW" dirty="0"/>
               <a:t>debug ?</a:t>
             </a:r>
           </a:p>

</xml_diff>